<commit_message>
Added Pipeline_Process.pptx to illustrate pipeline steps.
</commit_message>
<xml_diff>
--- a/Report/Pipeline_Process.pptx
+++ b/Report/Pipeline_Process.pptx
@@ -4,8 +4,12 @@
   <p:sldMasterIdLst>
     <p:sldMasterId id="2147483648" r:id="rId1"/>
   </p:sldMasterIdLst>
+  <p:notesMasterIdLst>
+    <p:notesMasterId r:id="rId4"/>
+  </p:notesMasterIdLst>
   <p:sldIdLst>
     <p:sldId id="256" r:id="rId2"/>
+    <p:sldId id="351" r:id="rId3"/>
   </p:sldIdLst>
   <p:sldSz cx="12192000" cy="6858000"/>
   <p:notesSz cx="6858000" cy="9144000"/>
@@ -121,6 +125,450 @@
     </p:ext>
   </p:extLst>
 </p:presentation>
+</file>
+
+<file path=ppt/notesMasters/notesMaster1.xml><?xml version="1.0" encoding="utf-8"?>
+<p:notesMaster xmlns:a="http://schemas.openxmlformats.org/drawingml/2006/main" xmlns:r="http://schemas.openxmlformats.org/officeDocument/2006/relationships" xmlns:p="http://schemas.openxmlformats.org/presentationml/2006/main">
+  <p:cSld>
+    <p:bg>
+      <p:bgRef idx="1001">
+        <a:schemeClr val="bg1"/>
+      </p:bgRef>
+    </p:bg>
+    <p:spTree>
+      <p:nvGrpSpPr>
+        <p:cNvPr id="1" name=""/>
+        <p:cNvGrpSpPr/>
+        <p:nvPr/>
+      </p:nvGrpSpPr>
+      <p:grpSpPr>
+        <a:xfrm>
+          <a:off x="0" y="0"/>
+          <a:ext cx="0" cy="0"/>
+          <a:chOff x="0" y="0"/>
+          <a:chExt cx="0" cy="0"/>
+        </a:xfrm>
+      </p:grpSpPr>
+      <p:sp>
+        <p:nvSpPr>
+          <p:cNvPr id="2" name="Header Placeholder 1"/>
+          <p:cNvSpPr>
+            <a:spLocks noGrp="1"/>
+          </p:cNvSpPr>
+          <p:nvPr>
+            <p:ph type="hdr" sz="quarter"/>
+          </p:nvPr>
+        </p:nvSpPr>
+        <p:spPr>
+          <a:xfrm>
+            <a:off x="0" y="0"/>
+            <a:ext cx="2971800" cy="458788"/>
+          </a:xfrm>
+          <a:prstGeom prst="rect">
+            <a:avLst/>
+          </a:prstGeom>
+        </p:spPr>
+        <p:txBody>
+          <a:bodyPr vert="horz" lIns="91440" tIns="45720" rIns="91440" bIns="45720" rtlCol="0"/>
+          <a:lstStyle>
+            <a:lvl1pPr algn="l">
+              <a:defRPr sz="1200"/>
+            </a:lvl1pPr>
+          </a:lstStyle>
+          <a:p>
+            <a:endParaRPr lang="en-US"/>
+          </a:p>
+        </p:txBody>
+      </p:sp>
+      <p:sp>
+        <p:nvSpPr>
+          <p:cNvPr id="3" name="Date Placeholder 2"/>
+          <p:cNvSpPr>
+            <a:spLocks noGrp="1"/>
+          </p:cNvSpPr>
+          <p:nvPr>
+            <p:ph type="dt" idx="1"/>
+          </p:nvPr>
+        </p:nvSpPr>
+        <p:spPr>
+          <a:xfrm>
+            <a:off x="3884613" y="0"/>
+            <a:ext cx="2971800" cy="458788"/>
+          </a:xfrm>
+          <a:prstGeom prst="rect">
+            <a:avLst/>
+          </a:prstGeom>
+        </p:spPr>
+        <p:txBody>
+          <a:bodyPr vert="horz" lIns="91440" tIns="45720" rIns="91440" bIns="45720" rtlCol="0"/>
+          <a:lstStyle>
+            <a:lvl1pPr algn="r">
+              <a:defRPr sz="1200"/>
+            </a:lvl1pPr>
+          </a:lstStyle>
+          <a:p>
+            <a:fld id="{D2F9E994-851E-CA40-9256-D22CD526733A}" type="datetimeFigureOut">
+              <a:rPr lang="en-US" smtClean="0"/>
+              <a:t>12/6/23</a:t>
+            </a:fld>
+            <a:endParaRPr lang="en-US"/>
+          </a:p>
+        </p:txBody>
+      </p:sp>
+      <p:sp>
+        <p:nvSpPr>
+          <p:cNvPr id="4" name="Slide Image Placeholder 3"/>
+          <p:cNvSpPr>
+            <a:spLocks noGrp="1" noRot="1" noChangeAspect="1"/>
+          </p:cNvSpPr>
+          <p:nvPr>
+            <p:ph type="sldImg" idx="2"/>
+          </p:nvPr>
+        </p:nvSpPr>
+        <p:spPr>
+          <a:xfrm>
+            <a:off x="685800" y="1143000"/>
+            <a:ext cx="5486400" cy="3086100"/>
+          </a:xfrm>
+          <a:prstGeom prst="rect">
+            <a:avLst/>
+          </a:prstGeom>
+          <a:noFill/>
+          <a:ln w="12700">
+            <a:solidFill>
+              <a:prstClr val="black"/>
+            </a:solidFill>
+          </a:ln>
+        </p:spPr>
+        <p:txBody>
+          <a:bodyPr vert="horz" lIns="91440" tIns="45720" rIns="91440" bIns="45720" rtlCol="0" anchor="ctr"/>
+          <a:lstStyle/>
+          <a:p>
+            <a:endParaRPr lang="en-US"/>
+          </a:p>
+        </p:txBody>
+      </p:sp>
+      <p:sp>
+        <p:nvSpPr>
+          <p:cNvPr id="5" name="Notes Placeholder 4"/>
+          <p:cNvSpPr>
+            <a:spLocks noGrp="1"/>
+          </p:cNvSpPr>
+          <p:nvPr>
+            <p:ph type="body" sz="quarter" idx="3"/>
+          </p:nvPr>
+        </p:nvSpPr>
+        <p:spPr>
+          <a:xfrm>
+            <a:off x="685800" y="4400550"/>
+            <a:ext cx="5486400" cy="3600450"/>
+          </a:xfrm>
+          <a:prstGeom prst="rect">
+            <a:avLst/>
+          </a:prstGeom>
+        </p:spPr>
+        <p:txBody>
+          <a:bodyPr vert="horz" lIns="91440" tIns="45720" rIns="91440" bIns="45720" rtlCol="0"/>
+          <a:lstStyle/>
+          <a:p>
+            <a:pPr lvl="0"/>
+            <a:r>
+              <a:rPr lang="en-US"/>
+              <a:t>Click to edit Master text styles</a:t>
+            </a:r>
+          </a:p>
+          <a:p>
+            <a:pPr lvl="1"/>
+            <a:r>
+              <a:rPr lang="en-US"/>
+              <a:t>Second level</a:t>
+            </a:r>
+          </a:p>
+          <a:p>
+            <a:pPr lvl="2"/>
+            <a:r>
+              <a:rPr lang="en-US"/>
+              <a:t>Third level</a:t>
+            </a:r>
+          </a:p>
+          <a:p>
+            <a:pPr lvl="3"/>
+            <a:r>
+              <a:rPr lang="en-US"/>
+              <a:t>Fourth level</a:t>
+            </a:r>
+          </a:p>
+          <a:p>
+            <a:pPr lvl="4"/>
+            <a:r>
+              <a:rPr lang="en-US"/>
+              <a:t>Fifth level</a:t>
+            </a:r>
+          </a:p>
+        </p:txBody>
+      </p:sp>
+      <p:sp>
+        <p:nvSpPr>
+          <p:cNvPr id="6" name="Footer Placeholder 5"/>
+          <p:cNvSpPr>
+            <a:spLocks noGrp="1"/>
+          </p:cNvSpPr>
+          <p:nvPr>
+            <p:ph type="ftr" sz="quarter" idx="4"/>
+          </p:nvPr>
+        </p:nvSpPr>
+        <p:spPr>
+          <a:xfrm>
+            <a:off x="0" y="8685213"/>
+            <a:ext cx="2971800" cy="458787"/>
+          </a:xfrm>
+          <a:prstGeom prst="rect">
+            <a:avLst/>
+          </a:prstGeom>
+        </p:spPr>
+        <p:txBody>
+          <a:bodyPr vert="horz" lIns="91440" tIns="45720" rIns="91440" bIns="45720" rtlCol="0" anchor="b"/>
+          <a:lstStyle>
+            <a:lvl1pPr algn="l">
+              <a:defRPr sz="1200"/>
+            </a:lvl1pPr>
+          </a:lstStyle>
+          <a:p>
+            <a:endParaRPr lang="en-US"/>
+          </a:p>
+        </p:txBody>
+      </p:sp>
+      <p:sp>
+        <p:nvSpPr>
+          <p:cNvPr id="7" name="Slide Number Placeholder 6"/>
+          <p:cNvSpPr>
+            <a:spLocks noGrp="1"/>
+          </p:cNvSpPr>
+          <p:nvPr>
+            <p:ph type="sldNum" sz="quarter" idx="5"/>
+          </p:nvPr>
+        </p:nvSpPr>
+        <p:spPr>
+          <a:xfrm>
+            <a:off x="3884613" y="8685213"/>
+            <a:ext cx="2971800" cy="458787"/>
+          </a:xfrm>
+          <a:prstGeom prst="rect">
+            <a:avLst/>
+          </a:prstGeom>
+        </p:spPr>
+        <p:txBody>
+          <a:bodyPr vert="horz" lIns="91440" tIns="45720" rIns="91440" bIns="45720" rtlCol="0" anchor="b"/>
+          <a:lstStyle>
+            <a:lvl1pPr algn="r">
+              <a:defRPr sz="1200"/>
+            </a:lvl1pPr>
+          </a:lstStyle>
+          <a:p>
+            <a:fld id="{9BFF15FB-80B3-6541-8E9E-6CCEA34B0796}" type="slidenum">
+              <a:rPr lang="en-US" smtClean="0"/>
+              <a:t>‹#›</a:t>
+            </a:fld>
+            <a:endParaRPr lang="en-US"/>
+          </a:p>
+        </p:txBody>
+      </p:sp>
+    </p:spTree>
+    <p:extLst>
+      <p:ext uri="{BB962C8B-B14F-4D97-AF65-F5344CB8AC3E}">
+        <p14:creationId xmlns:p14="http://schemas.microsoft.com/office/powerpoint/2010/main" val="1819266525"/>
+      </p:ext>
+    </p:extLst>
+  </p:cSld>
+  <p:clrMap bg1="lt1" tx1="dk1" bg2="lt2" tx2="dk2" accent1="accent1" accent2="accent2" accent3="accent3" accent4="accent4" accent5="accent5" accent6="accent6" hlink="hlink" folHlink="folHlink"/>
+  <p:notesStyle>
+    <a:lvl1pPr marL="0" algn="l" defTabSz="914400" rtl="0" eaLnBrk="1" latinLnBrk="0" hangingPunct="1">
+      <a:defRPr sz="1200" kern="1200">
+        <a:solidFill>
+          <a:schemeClr val="tx1"/>
+        </a:solidFill>
+        <a:latin typeface="+mn-lt"/>
+        <a:ea typeface="+mn-ea"/>
+        <a:cs typeface="+mn-cs"/>
+      </a:defRPr>
+    </a:lvl1pPr>
+    <a:lvl2pPr marL="457200" algn="l" defTabSz="914400" rtl="0" eaLnBrk="1" latinLnBrk="0" hangingPunct="1">
+      <a:defRPr sz="1200" kern="1200">
+        <a:solidFill>
+          <a:schemeClr val="tx1"/>
+        </a:solidFill>
+        <a:latin typeface="+mn-lt"/>
+        <a:ea typeface="+mn-ea"/>
+        <a:cs typeface="+mn-cs"/>
+      </a:defRPr>
+    </a:lvl2pPr>
+    <a:lvl3pPr marL="914400" algn="l" defTabSz="914400" rtl="0" eaLnBrk="1" latinLnBrk="0" hangingPunct="1">
+      <a:defRPr sz="1200" kern="1200">
+        <a:solidFill>
+          <a:schemeClr val="tx1"/>
+        </a:solidFill>
+        <a:latin typeface="+mn-lt"/>
+        <a:ea typeface="+mn-ea"/>
+        <a:cs typeface="+mn-cs"/>
+      </a:defRPr>
+    </a:lvl3pPr>
+    <a:lvl4pPr marL="1371600" algn="l" defTabSz="914400" rtl="0" eaLnBrk="1" latinLnBrk="0" hangingPunct="1">
+      <a:defRPr sz="1200" kern="1200">
+        <a:solidFill>
+          <a:schemeClr val="tx1"/>
+        </a:solidFill>
+        <a:latin typeface="+mn-lt"/>
+        <a:ea typeface="+mn-ea"/>
+        <a:cs typeface="+mn-cs"/>
+      </a:defRPr>
+    </a:lvl4pPr>
+    <a:lvl5pPr marL="1828800" algn="l" defTabSz="914400" rtl="0" eaLnBrk="1" latinLnBrk="0" hangingPunct="1">
+      <a:defRPr sz="1200" kern="1200">
+        <a:solidFill>
+          <a:schemeClr val="tx1"/>
+        </a:solidFill>
+        <a:latin typeface="+mn-lt"/>
+        <a:ea typeface="+mn-ea"/>
+        <a:cs typeface="+mn-cs"/>
+      </a:defRPr>
+    </a:lvl5pPr>
+    <a:lvl6pPr marL="2286000" algn="l" defTabSz="914400" rtl="0" eaLnBrk="1" latinLnBrk="0" hangingPunct="1">
+      <a:defRPr sz="1200" kern="1200">
+        <a:solidFill>
+          <a:schemeClr val="tx1"/>
+        </a:solidFill>
+        <a:latin typeface="+mn-lt"/>
+        <a:ea typeface="+mn-ea"/>
+        <a:cs typeface="+mn-cs"/>
+      </a:defRPr>
+    </a:lvl6pPr>
+    <a:lvl7pPr marL="2743200" algn="l" defTabSz="914400" rtl="0" eaLnBrk="1" latinLnBrk="0" hangingPunct="1">
+      <a:defRPr sz="1200" kern="1200">
+        <a:solidFill>
+          <a:schemeClr val="tx1"/>
+        </a:solidFill>
+        <a:latin typeface="+mn-lt"/>
+        <a:ea typeface="+mn-ea"/>
+        <a:cs typeface="+mn-cs"/>
+      </a:defRPr>
+    </a:lvl7pPr>
+    <a:lvl8pPr marL="3200400" algn="l" defTabSz="914400" rtl="0" eaLnBrk="1" latinLnBrk="0" hangingPunct="1">
+      <a:defRPr sz="1200" kern="1200">
+        <a:solidFill>
+          <a:schemeClr val="tx1"/>
+        </a:solidFill>
+        <a:latin typeface="+mn-lt"/>
+        <a:ea typeface="+mn-ea"/>
+        <a:cs typeface="+mn-cs"/>
+      </a:defRPr>
+    </a:lvl8pPr>
+    <a:lvl9pPr marL="3657600" algn="l" defTabSz="914400" rtl="0" eaLnBrk="1" latinLnBrk="0" hangingPunct="1">
+      <a:defRPr sz="1200" kern="1200">
+        <a:solidFill>
+          <a:schemeClr val="tx1"/>
+        </a:solidFill>
+        <a:latin typeface="+mn-lt"/>
+        <a:ea typeface="+mn-ea"/>
+        <a:cs typeface="+mn-cs"/>
+      </a:defRPr>
+    </a:lvl9pPr>
+  </p:notesStyle>
+</p:notesMaster>
+</file>
+
+<file path=ppt/notesSlides/notesSlide1.xml><?xml version="1.0" encoding="utf-8"?>
+<p:notes xmlns:a="http://schemas.openxmlformats.org/drawingml/2006/main" xmlns:r="http://schemas.openxmlformats.org/officeDocument/2006/relationships" xmlns:p="http://schemas.openxmlformats.org/presentationml/2006/main">
+  <p:cSld>
+    <p:spTree>
+      <p:nvGrpSpPr>
+        <p:cNvPr id="1" name=""/>
+        <p:cNvGrpSpPr/>
+        <p:nvPr/>
+      </p:nvGrpSpPr>
+      <p:grpSpPr>
+        <a:xfrm>
+          <a:off x="0" y="0"/>
+          <a:ext cx="0" cy="0"/>
+          <a:chOff x="0" y="0"/>
+          <a:chExt cx="0" cy="0"/>
+        </a:xfrm>
+      </p:grpSpPr>
+      <p:sp>
+        <p:nvSpPr>
+          <p:cNvPr id="2" name="Slide Image Placeholder 1"/>
+          <p:cNvSpPr>
+            <a:spLocks noGrp="1" noRot="1" noChangeAspect="1"/>
+          </p:cNvSpPr>
+          <p:nvPr>
+            <p:ph type="sldImg"/>
+          </p:nvPr>
+        </p:nvSpPr>
+        <p:spPr/>
+      </p:sp>
+      <p:sp>
+        <p:nvSpPr>
+          <p:cNvPr id="3" name="Notes Placeholder 2"/>
+          <p:cNvSpPr>
+            <a:spLocks noGrp="1"/>
+          </p:cNvSpPr>
+          <p:nvPr>
+            <p:ph type="body" idx="1"/>
+          </p:nvPr>
+        </p:nvSpPr>
+        <p:spPr/>
+        <p:txBody>
+          <a:bodyPr/>
+          <a:lstStyle/>
+          <a:p>
+            <a:r>
+              <a:rPr lang="en-US" dirty="0"/>
+              <a:t>© Copyright </a:t>
+            </a:r>
+            <a:r>
+              <a:rPr lang="en-US" b="1" dirty="0"/>
+              <a:t>PresentationGO.com</a:t>
+            </a:r>
+            <a:r>
+              <a:rPr lang="en-US" dirty="0"/>
+              <a:t> – The free PowerPoint and Google Slides template library</a:t>
+            </a:r>
+          </a:p>
+        </p:txBody>
+      </p:sp>
+      <p:sp>
+        <p:nvSpPr>
+          <p:cNvPr id="4" name="Slide Number Placeholder 3"/>
+          <p:cNvSpPr>
+            <a:spLocks noGrp="1"/>
+          </p:cNvSpPr>
+          <p:nvPr>
+            <p:ph type="sldNum" sz="quarter" idx="10"/>
+          </p:nvPr>
+        </p:nvSpPr>
+        <p:spPr/>
+        <p:txBody>
+          <a:bodyPr/>
+          <a:lstStyle/>
+          <a:p>
+            <a:fld id="{B68D2766-C49B-4C1A-9FEE-6F146754B02B}" type="slidenum">
+              <a:rPr lang="en-US" smtClean="0"/>
+              <a:t>2</a:t>
+            </a:fld>
+            <a:endParaRPr lang="en-US"/>
+          </a:p>
+        </p:txBody>
+      </p:sp>
+    </p:spTree>
+    <p:extLst>
+      <p:ext uri="{BB962C8B-B14F-4D97-AF65-F5344CB8AC3E}">
+        <p14:creationId xmlns:p14="http://schemas.microsoft.com/office/powerpoint/2010/main" val="1424680188"/>
+      </p:ext>
+    </p:extLst>
+  </p:cSld>
+  <p:clrMapOvr>
+    <a:masterClrMapping/>
+  </p:clrMapOvr>
+</p:notes>
 </file>
 
 <file path=ppt/slideLayouts/slideLayout1.xml><?xml version="1.0" encoding="utf-8"?>
@@ -3347,9 +3795,7 @@
     <p:bg>
       <p:bgPr>
         <a:solidFill>
-          <a:schemeClr val="bg1">
-            <a:lumMod val="95000"/>
-          </a:schemeClr>
+          <a:schemeClr val="bg1"/>
         </a:solidFill>
         <a:effectLst/>
       </p:bgPr>
@@ -9300,7 +9746,7 @@
                 <a:latin typeface="Agency FB" panose="020B0503020202020204" pitchFamily="34" charset="0"/>
                 <a:ea typeface="Cambria" panose="02040503050406030204" pitchFamily="18" charset="0"/>
               </a:rPr>
-              <a:t>Production</a:t>
+              <a:t>Load</a:t>
             </a:r>
           </a:p>
           <a:p>
@@ -9317,7 +9763,7 @@
                 <a:ea typeface="Cambria" panose="02040503050406030204" pitchFamily="18" charset="0"/>
                 <a:cs typeface="Cardo" panose="02020600000000000000" pitchFamily="18" charset="-79"/>
               </a:rPr>
-              <a:t>3:1 Duplicates-to-Unique Records Eliminated Stored in </a:t>
+              <a:t>3:1 Duplicates-to-Unique Records Eliminated and Stored in </a:t>
             </a:r>
             <a:r>
               <a:rPr lang="en-CA" b="1" dirty="0">
@@ -9589,6 +10035,1939 @@
     <p:extLst>
       <p:ext uri="{BB962C8B-B14F-4D97-AF65-F5344CB8AC3E}">
         <p14:creationId xmlns:p14="http://schemas.microsoft.com/office/powerpoint/2010/main" val="4210945170"/>
+      </p:ext>
+    </p:extLst>
+  </p:cSld>
+  <p:clrMapOvr>
+    <a:masterClrMapping/>
+  </p:clrMapOvr>
+</p:sld>
+</file>
+
+<file path=ppt/slides/slide2.xml><?xml version="1.0" encoding="utf-8"?>
+<p:sld xmlns:a="http://schemas.openxmlformats.org/drawingml/2006/main" xmlns:r="http://schemas.openxmlformats.org/officeDocument/2006/relationships" xmlns:p="http://schemas.openxmlformats.org/presentationml/2006/main">
+  <p:cSld>
+    <p:spTree>
+      <p:nvGrpSpPr>
+        <p:cNvPr id="1" name=""/>
+        <p:cNvGrpSpPr/>
+        <p:nvPr/>
+      </p:nvGrpSpPr>
+      <p:grpSpPr>
+        <a:xfrm>
+          <a:off x="0" y="0"/>
+          <a:ext cx="0" cy="0"/>
+          <a:chOff x="0" y="0"/>
+          <a:chExt cx="0" cy="0"/>
+        </a:xfrm>
+      </p:grpSpPr>
+      <p:sp>
+        <p:nvSpPr>
+          <p:cNvPr id="6" name="Rectangle 5">
+            <a:extLst>
+              <a:ext uri="{FF2B5EF4-FFF2-40B4-BE49-F238E27FC236}">
+                <a16:creationId xmlns:a16="http://schemas.microsoft.com/office/drawing/2014/main" id="{B713DDAB-DD84-466B-8C58-14383A7FC319}"/>
+              </a:ext>
+            </a:extLst>
+          </p:cNvPr>
+          <p:cNvSpPr/>
+          <p:nvPr/>
+        </p:nvSpPr>
+        <p:spPr>
+          <a:xfrm>
+            <a:off x="2568118" y="2609299"/>
+            <a:ext cx="6166817" cy="1125020"/>
+          </a:xfrm>
+          <a:prstGeom prst="rect">
+            <a:avLst/>
+          </a:prstGeom>
+          <a:solidFill>
+            <a:schemeClr val="bg2"/>
+          </a:solidFill>
+          <a:ln>
+            <a:noFill/>
+          </a:ln>
+        </p:spPr>
+        <p:style>
+          <a:lnRef idx="2">
+            <a:schemeClr val="accent1">
+              <a:shade val="50000"/>
+            </a:schemeClr>
+          </a:lnRef>
+          <a:fillRef idx="1">
+            <a:schemeClr val="accent1"/>
+          </a:fillRef>
+          <a:effectRef idx="0">
+            <a:schemeClr val="accent1"/>
+          </a:effectRef>
+          <a:fontRef idx="minor">
+            <a:schemeClr val="lt1"/>
+          </a:fontRef>
+        </p:style>
+        <p:txBody>
+          <a:bodyPr rot="0" spcFirstLastPara="0" vertOverflow="overflow" horzOverflow="overflow" vert="horz" wrap="square" lIns="68580" tIns="34290" rIns="68580" bIns="34290" numCol="1" spcCol="0" rtlCol="0" fromWordArt="0" anchor="ctr" anchorCtr="0" forceAA="0" compatLnSpc="1">
+            <a:prstTxWarp prst="textNoShape">
+              <a:avLst/>
+            </a:prstTxWarp>
+            <a:noAutofit/>
+          </a:bodyPr>
+          <a:lstStyle/>
+          <a:p>
+            <a:pPr algn="ctr"/>
+            <a:endParaRPr lang="en-US" sz="1350"/>
+          </a:p>
+        </p:txBody>
+      </p:sp>
+      <p:sp>
+        <p:nvSpPr>
+          <p:cNvPr id="88" name="Rectangle 87">
+            <a:extLst>
+              <a:ext uri="{FF2B5EF4-FFF2-40B4-BE49-F238E27FC236}">
+                <a16:creationId xmlns:a16="http://schemas.microsoft.com/office/drawing/2014/main" id="{ACD2CF18-0CDF-4FEE-BBF1-CF5CAC54B703}"/>
+              </a:ext>
+            </a:extLst>
+          </p:cNvPr>
+          <p:cNvSpPr/>
+          <p:nvPr/>
+        </p:nvSpPr>
+        <p:spPr>
+          <a:xfrm>
+            <a:off x="2568118" y="3122589"/>
+            <a:ext cx="6166817" cy="610655"/>
+          </a:xfrm>
+          <a:prstGeom prst="rect">
+            <a:avLst/>
+          </a:prstGeom>
+          <a:solidFill>
+            <a:schemeClr val="bg2">
+              <a:lumMod val="90000"/>
+            </a:schemeClr>
+          </a:solidFill>
+          <a:ln>
+            <a:noFill/>
+          </a:ln>
+        </p:spPr>
+        <p:style>
+          <a:lnRef idx="2">
+            <a:schemeClr val="accent1">
+              <a:shade val="50000"/>
+            </a:schemeClr>
+          </a:lnRef>
+          <a:fillRef idx="1">
+            <a:schemeClr val="accent1"/>
+          </a:fillRef>
+          <a:effectRef idx="0">
+            <a:schemeClr val="accent1"/>
+          </a:effectRef>
+          <a:fontRef idx="minor">
+            <a:schemeClr val="lt1"/>
+          </a:fontRef>
+        </p:style>
+        <p:txBody>
+          <a:bodyPr rot="0" spcFirstLastPara="0" vertOverflow="overflow" horzOverflow="overflow" vert="horz" wrap="square" lIns="68580" tIns="34290" rIns="68580" bIns="34290" numCol="1" spcCol="0" rtlCol="0" fromWordArt="0" anchor="ctr" anchorCtr="0" forceAA="0" compatLnSpc="1">
+            <a:prstTxWarp prst="textNoShape">
+              <a:avLst/>
+            </a:prstTxWarp>
+            <a:noAutofit/>
+          </a:bodyPr>
+          <a:lstStyle/>
+          <a:p>
+            <a:pPr algn="ctr"/>
+            <a:endParaRPr lang="en-US" sz="1350"/>
+          </a:p>
+        </p:txBody>
+      </p:sp>
+      <p:sp>
+        <p:nvSpPr>
+          <p:cNvPr id="2" name="Title 1">
+            <a:extLst>
+              <a:ext uri="{FF2B5EF4-FFF2-40B4-BE49-F238E27FC236}">
+                <a16:creationId xmlns:a16="http://schemas.microsoft.com/office/drawing/2014/main" id="{2C2BFAE1-45D3-4B3B-81D2-0BF25FA84FB8}"/>
+              </a:ext>
+            </a:extLst>
+          </p:cNvPr>
+          <p:cNvSpPr>
+            <a:spLocks noGrp="1"/>
+          </p:cNvSpPr>
+          <p:nvPr>
+            <p:ph type="title"/>
+          </p:nvPr>
+        </p:nvSpPr>
+        <p:spPr/>
+        <p:txBody>
+          <a:bodyPr>
+            <a:noAutofit/>
+          </a:bodyPr>
+          <a:lstStyle/>
+          <a:p>
+            <a:r>
+              <a:rPr lang="en-US" dirty="0"/>
+              <a:t>Pipe Process Execution Time</a:t>
+            </a:r>
+          </a:p>
+        </p:txBody>
+      </p:sp>
+      <p:sp>
+        <p:nvSpPr>
+          <p:cNvPr id="34" name="Flowchart: Stored Data 33">
+            <a:extLst>
+              <a:ext uri="{FF2B5EF4-FFF2-40B4-BE49-F238E27FC236}">
+                <a16:creationId xmlns:a16="http://schemas.microsoft.com/office/drawing/2014/main" id="{808CFAD2-93A9-4DFB-A25E-384C45BAF5EC}"/>
+              </a:ext>
+            </a:extLst>
+          </p:cNvPr>
+          <p:cNvSpPr/>
+          <p:nvPr/>
+        </p:nvSpPr>
+        <p:spPr>
+          <a:xfrm rot="10800000">
+            <a:off x="8227249" y="2609315"/>
+            <a:ext cx="1676029" cy="1125020"/>
+          </a:xfrm>
+          <a:prstGeom prst="flowChartOnlineStorage">
+            <a:avLst/>
+          </a:prstGeom>
+          <a:solidFill>
+            <a:schemeClr val="accent5"/>
+          </a:solidFill>
+          <a:ln>
+            <a:noFill/>
+          </a:ln>
+        </p:spPr>
+        <p:style>
+          <a:lnRef idx="2">
+            <a:schemeClr val="accent1">
+              <a:shade val="50000"/>
+            </a:schemeClr>
+          </a:lnRef>
+          <a:fillRef idx="1">
+            <a:schemeClr val="accent1"/>
+          </a:fillRef>
+          <a:effectRef idx="0">
+            <a:schemeClr val="accent1"/>
+          </a:effectRef>
+          <a:fontRef idx="minor">
+            <a:schemeClr val="lt1"/>
+          </a:fontRef>
+        </p:style>
+        <p:txBody>
+          <a:bodyPr rtlCol="0" anchor="ctr"/>
+          <a:lstStyle/>
+          <a:p>
+            <a:pPr algn="ctr"/>
+            <a:endParaRPr lang="en-US" sz="1350"/>
+          </a:p>
+        </p:txBody>
+      </p:sp>
+      <p:sp>
+        <p:nvSpPr>
+          <p:cNvPr id="35" name="Flowchart: Stored Data 34">
+            <a:extLst>
+              <a:ext uri="{FF2B5EF4-FFF2-40B4-BE49-F238E27FC236}">
+                <a16:creationId xmlns:a16="http://schemas.microsoft.com/office/drawing/2014/main" id="{5CFD55C9-6FD9-4599-85A2-101FC59DD362}"/>
+              </a:ext>
+            </a:extLst>
+          </p:cNvPr>
+          <p:cNvSpPr/>
+          <p:nvPr/>
+        </p:nvSpPr>
+        <p:spPr>
+          <a:xfrm rot="10800000">
+            <a:off x="6463309" y="2609315"/>
+            <a:ext cx="1676029" cy="1125020"/>
+          </a:xfrm>
+          <a:prstGeom prst="flowChartOnlineStorage">
+            <a:avLst/>
+          </a:prstGeom>
+          <a:solidFill>
+            <a:schemeClr val="accent3"/>
+          </a:solidFill>
+          <a:ln>
+            <a:noFill/>
+          </a:ln>
+        </p:spPr>
+        <p:style>
+          <a:lnRef idx="2">
+            <a:schemeClr val="accent1">
+              <a:shade val="50000"/>
+            </a:schemeClr>
+          </a:lnRef>
+          <a:fillRef idx="1">
+            <a:schemeClr val="accent1"/>
+          </a:fillRef>
+          <a:effectRef idx="0">
+            <a:schemeClr val="accent1"/>
+          </a:effectRef>
+          <a:fontRef idx="minor">
+            <a:schemeClr val="lt1"/>
+          </a:fontRef>
+        </p:style>
+        <p:txBody>
+          <a:bodyPr rtlCol="0" anchor="ctr"/>
+          <a:lstStyle/>
+          <a:p>
+            <a:pPr algn="ctr"/>
+            <a:endParaRPr lang="en-US" sz="1350"/>
+          </a:p>
+        </p:txBody>
+      </p:sp>
+      <p:sp>
+        <p:nvSpPr>
+          <p:cNvPr id="36" name="Flowchart: Stored Data 35">
+            <a:extLst>
+              <a:ext uri="{FF2B5EF4-FFF2-40B4-BE49-F238E27FC236}">
+                <a16:creationId xmlns:a16="http://schemas.microsoft.com/office/drawing/2014/main" id="{6581FCA4-B720-4EC1-A90E-76CA07F27B3C}"/>
+              </a:ext>
+            </a:extLst>
+          </p:cNvPr>
+          <p:cNvSpPr/>
+          <p:nvPr/>
+        </p:nvSpPr>
+        <p:spPr>
+          <a:xfrm rot="10800000">
+            <a:off x="4699368" y="2609315"/>
+            <a:ext cx="1676029" cy="1125020"/>
+          </a:xfrm>
+          <a:prstGeom prst="flowChartOnlineStorage">
+            <a:avLst/>
+          </a:prstGeom>
+          <a:solidFill>
+            <a:schemeClr val="accent2"/>
+          </a:solidFill>
+          <a:ln>
+            <a:noFill/>
+          </a:ln>
+        </p:spPr>
+        <p:style>
+          <a:lnRef idx="2">
+            <a:schemeClr val="accent1">
+              <a:shade val="50000"/>
+            </a:schemeClr>
+          </a:lnRef>
+          <a:fillRef idx="1">
+            <a:schemeClr val="accent1"/>
+          </a:fillRef>
+          <a:effectRef idx="0">
+            <a:schemeClr val="accent1"/>
+          </a:effectRef>
+          <a:fontRef idx="minor">
+            <a:schemeClr val="lt1"/>
+          </a:fontRef>
+        </p:style>
+        <p:txBody>
+          <a:bodyPr rtlCol="0" anchor="ctr"/>
+          <a:lstStyle/>
+          <a:p>
+            <a:pPr algn="ctr"/>
+            <a:endParaRPr lang="en-US" sz="1350"/>
+          </a:p>
+        </p:txBody>
+      </p:sp>
+      <p:sp>
+        <p:nvSpPr>
+          <p:cNvPr id="37" name="Flowchart: Stored Data 36">
+            <a:extLst>
+              <a:ext uri="{FF2B5EF4-FFF2-40B4-BE49-F238E27FC236}">
+                <a16:creationId xmlns:a16="http://schemas.microsoft.com/office/drawing/2014/main" id="{7110CA39-0D39-454E-A9D9-4AFB997A4005}"/>
+              </a:ext>
+            </a:extLst>
+          </p:cNvPr>
+          <p:cNvSpPr/>
+          <p:nvPr/>
+        </p:nvSpPr>
+        <p:spPr>
+          <a:xfrm rot="10800000">
+            <a:off x="2935426" y="2609315"/>
+            <a:ext cx="1676029" cy="1125020"/>
+          </a:xfrm>
+          <a:prstGeom prst="flowChartOnlineStorage">
+            <a:avLst/>
+          </a:prstGeom>
+          <a:solidFill>
+            <a:schemeClr val="accent1"/>
+          </a:solidFill>
+          <a:ln>
+            <a:noFill/>
+          </a:ln>
+        </p:spPr>
+        <p:style>
+          <a:lnRef idx="2">
+            <a:schemeClr val="accent1">
+              <a:shade val="50000"/>
+            </a:schemeClr>
+          </a:lnRef>
+          <a:fillRef idx="1">
+            <a:schemeClr val="accent1"/>
+          </a:fillRef>
+          <a:effectRef idx="0">
+            <a:schemeClr val="accent1"/>
+          </a:effectRef>
+          <a:fontRef idx="minor">
+            <a:schemeClr val="lt1"/>
+          </a:fontRef>
+        </p:style>
+        <p:txBody>
+          <a:bodyPr rtlCol="0" anchor="ctr"/>
+          <a:lstStyle/>
+          <a:p>
+            <a:pPr algn="ctr"/>
+            <a:endParaRPr lang="en-US" sz="1350" dirty="0"/>
+          </a:p>
+        </p:txBody>
+      </p:sp>
+      <p:sp>
+        <p:nvSpPr>
+          <p:cNvPr id="38" name="Freeform: Shape 37">
+            <a:extLst>
+              <a:ext uri="{FF2B5EF4-FFF2-40B4-BE49-F238E27FC236}">
+                <a16:creationId xmlns:a16="http://schemas.microsoft.com/office/drawing/2014/main" id="{B4E74386-AF58-4A6C-A797-A81958A349A3}"/>
+              </a:ext>
+            </a:extLst>
+          </p:cNvPr>
+          <p:cNvSpPr/>
+          <p:nvPr/>
+        </p:nvSpPr>
+        <p:spPr>
+          <a:xfrm rot="10800000" flipH="1">
+            <a:off x="2288725" y="2609299"/>
+            <a:ext cx="558788" cy="1125036"/>
+          </a:xfrm>
+          <a:custGeom>
+            <a:avLst/>
+            <a:gdLst>
+              <a:gd name="connsiteX0" fmla="*/ 372524 w 745051"/>
+              <a:gd name="connsiteY0" fmla="*/ 1500027 h 1500048"/>
+              <a:gd name="connsiteX1" fmla="*/ 372525 w 745051"/>
+              <a:gd name="connsiteY1" fmla="*/ 1500027 h 1500048"/>
+              <a:gd name="connsiteX2" fmla="*/ 745051 w 745051"/>
+              <a:gd name="connsiteY2" fmla="*/ 750013 h 1500048"/>
+              <a:gd name="connsiteX3" fmla="*/ 372525 w 745051"/>
+              <a:gd name="connsiteY3" fmla="*/ 0 h 1500048"/>
+              <a:gd name="connsiteX4" fmla="*/ 372524 w 745051"/>
+              <a:gd name="connsiteY4" fmla="*/ 0 h 1500048"/>
+              <a:gd name="connsiteX5" fmla="*/ 372522 w 745051"/>
+              <a:gd name="connsiteY5" fmla="*/ 1500048 h 1500048"/>
+              <a:gd name="connsiteX6" fmla="*/ 372523 w 745051"/>
+              <a:gd name="connsiteY6" fmla="*/ 1500048 h 1500048"/>
+              <a:gd name="connsiteX7" fmla="*/ 372523 w 745051"/>
+              <a:gd name="connsiteY7" fmla="*/ 21 h 1500048"/>
+              <a:gd name="connsiteX8" fmla="*/ 372522 w 745051"/>
+              <a:gd name="connsiteY8" fmla="*/ 21 h 1500048"/>
+              <a:gd name="connsiteX9" fmla="*/ 0 w 745051"/>
+              <a:gd name="connsiteY9" fmla="*/ 750034 h 1500048"/>
+              <a:gd name="connsiteX10" fmla="*/ 372522 w 745051"/>
+              <a:gd name="connsiteY10" fmla="*/ 1500048 h 1500048"/>
+            </a:gdLst>
+            <a:ahLst/>
+            <a:cxnLst>
+              <a:cxn ang="0">
+                <a:pos x="connsiteX0" y="connsiteY0"/>
+              </a:cxn>
+              <a:cxn ang="0">
+                <a:pos x="connsiteX1" y="connsiteY1"/>
+              </a:cxn>
+              <a:cxn ang="0">
+                <a:pos x="connsiteX2" y="connsiteY2"/>
+              </a:cxn>
+              <a:cxn ang="0">
+                <a:pos x="connsiteX3" y="connsiteY3"/>
+              </a:cxn>
+              <a:cxn ang="0">
+                <a:pos x="connsiteX4" y="connsiteY4"/>
+              </a:cxn>
+              <a:cxn ang="0">
+                <a:pos x="connsiteX5" y="connsiteY5"/>
+              </a:cxn>
+              <a:cxn ang="0">
+                <a:pos x="connsiteX6" y="connsiteY6"/>
+              </a:cxn>
+              <a:cxn ang="0">
+                <a:pos x="connsiteX7" y="connsiteY7"/>
+              </a:cxn>
+              <a:cxn ang="0">
+                <a:pos x="connsiteX8" y="connsiteY8"/>
+              </a:cxn>
+              <a:cxn ang="0">
+                <a:pos x="connsiteX9" y="connsiteY9"/>
+              </a:cxn>
+              <a:cxn ang="0">
+                <a:pos x="connsiteX10" y="connsiteY10"/>
+              </a:cxn>
+            </a:cxnLst>
+            <a:rect l="l" t="t" r="r" b="b"/>
+            <a:pathLst>
+              <a:path w="745051" h="1500048">
+                <a:moveTo>
+                  <a:pt x="372524" y="1500027"/>
+                </a:moveTo>
+                <a:lnTo>
+                  <a:pt x="372525" y="1500027"/>
+                </a:lnTo>
+                <a:cubicBezTo>
+                  <a:pt x="578342" y="1500027"/>
+                  <a:pt x="745051" y="1164171"/>
+                  <a:pt x="745051" y="750013"/>
+                </a:cubicBezTo>
+                <a:cubicBezTo>
+                  <a:pt x="745051" y="335856"/>
+                  <a:pt x="578342" y="0"/>
+                  <a:pt x="372525" y="0"/>
+                </a:cubicBezTo>
+                <a:lnTo>
+                  <a:pt x="372524" y="0"/>
+                </a:lnTo>
+                <a:close/>
+                <a:moveTo>
+                  <a:pt x="372522" y="1500048"/>
+                </a:moveTo>
+                <a:lnTo>
+                  <a:pt x="372523" y="1500048"/>
+                </a:lnTo>
+                <a:lnTo>
+                  <a:pt x="372523" y="21"/>
+                </a:lnTo>
+                <a:lnTo>
+                  <a:pt x="372522" y="21"/>
+                </a:lnTo>
+                <a:cubicBezTo>
+                  <a:pt x="166707" y="21"/>
+                  <a:pt x="0" y="335877"/>
+                  <a:pt x="0" y="750034"/>
+                </a:cubicBezTo>
+                <a:cubicBezTo>
+                  <a:pt x="0" y="1164192"/>
+                  <a:pt x="166707" y="1500048"/>
+                  <a:pt x="372522" y="1500048"/>
+                </a:cubicBezTo>
+                <a:close/>
+              </a:path>
+            </a:pathLst>
+          </a:custGeom>
+          <a:solidFill>
+            <a:schemeClr val="tx2"/>
+          </a:solidFill>
+          <a:ln>
+            <a:noFill/>
+          </a:ln>
+        </p:spPr>
+        <p:style>
+          <a:lnRef idx="2">
+            <a:schemeClr val="accent1">
+              <a:shade val="50000"/>
+            </a:schemeClr>
+          </a:lnRef>
+          <a:fillRef idx="1">
+            <a:schemeClr val="accent1"/>
+          </a:fillRef>
+          <a:effectRef idx="0">
+            <a:schemeClr val="accent1"/>
+          </a:effectRef>
+          <a:fontRef idx="minor">
+            <a:schemeClr val="lt1"/>
+          </a:fontRef>
+        </p:style>
+        <p:txBody>
+          <a:bodyPr rtlCol="0" anchor="ctr"/>
+          <a:lstStyle/>
+          <a:p>
+            <a:pPr algn="ctr"/>
+            <a:endParaRPr lang="en-US" sz="1350"/>
+          </a:p>
+        </p:txBody>
+      </p:sp>
+      <p:sp>
+        <p:nvSpPr>
+          <p:cNvPr id="89" name="Freeform: Shape 88">
+            <a:extLst>
+              <a:ext uri="{FF2B5EF4-FFF2-40B4-BE49-F238E27FC236}">
+                <a16:creationId xmlns:a16="http://schemas.microsoft.com/office/drawing/2014/main" id="{CBFCB4F5-5F6E-43F1-9DF1-55070E7F9E0B}"/>
+              </a:ext>
+            </a:extLst>
+          </p:cNvPr>
+          <p:cNvSpPr/>
+          <p:nvPr/>
+        </p:nvSpPr>
+        <p:spPr>
+          <a:xfrm>
+            <a:off x="2288725" y="3123665"/>
+            <a:ext cx="558788" cy="610670"/>
+          </a:xfrm>
+          <a:custGeom>
+            <a:avLst/>
+            <a:gdLst>
+              <a:gd name="connsiteX0" fmla="*/ 3213 w 745051"/>
+              <a:gd name="connsiteY0" fmla="*/ 1 h 814226"/>
+              <a:gd name="connsiteX1" fmla="*/ 372523 w 745051"/>
+              <a:gd name="connsiteY1" fmla="*/ 1 h 814226"/>
+              <a:gd name="connsiteX2" fmla="*/ 372523 w 745051"/>
+              <a:gd name="connsiteY2" fmla="*/ 814206 h 814226"/>
+              <a:gd name="connsiteX3" fmla="*/ 372522 w 745051"/>
+              <a:gd name="connsiteY3" fmla="*/ 814206 h 814226"/>
+              <a:gd name="connsiteX4" fmla="*/ 0 w 745051"/>
+              <a:gd name="connsiteY4" fmla="*/ 64193 h 814226"/>
+              <a:gd name="connsiteX5" fmla="*/ 372524 w 745051"/>
+              <a:gd name="connsiteY5" fmla="*/ 0 h 814226"/>
+              <a:gd name="connsiteX6" fmla="*/ 741837 w 745051"/>
+              <a:gd name="connsiteY6" fmla="*/ 0 h 814226"/>
+              <a:gd name="connsiteX7" fmla="*/ 745051 w 745051"/>
+              <a:gd name="connsiteY7" fmla="*/ 64213 h 814226"/>
+              <a:gd name="connsiteX8" fmla="*/ 372525 w 745051"/>
+              <a:gd name="connsiteY8" fmla="*/ 814226 h 814226"/>
+              <a:gd name="connsiteX9" fmla="*/ 372524 w 745051"/>
+              <a:gd name="connsiteY9" fmla="*/ 814226 h 814226"/>
+            </a:gdLst>
+            <a:ahLst/>
+            <a:cxnLst>
+              <a:cxn ang="0">
+                <a:pos x="connsiteX0" y="connsiteY0"/>
+              </a:cxn>
+              <a:cxn ang="0">
+                <a:pos x="connsiteX1" y="connsiteY1"/>
+              </a:cxn>
+              <a:cxn ang="0">
+                <a:pos x="connsiteX2" y="connsiteY2"/>
+              </a:cxn>
+              <a:cxn ang="0">
+                <a:pos x="connsiteX3" y="connsiteY3"/>
+              </a:cxn>
+              <a:cxn ang="0">
+                <a:pos x="connsiteX4" y="connsiteY4"/>
+              </a:cxn>
+              <a:cxn ang="0">
+                <a:pos x="connsiteX5" y="connsiteY5"/>
+              </a:cxn>
+              <a:cxn ang="0">
+                <a:pos x="connsiteX6" y="connsiteY6"/>
+              </a:cxn>
+              <a:cxn ang="0">
+                <a:pos x="connsiteX7" y="connsiteY7"/>
+              </a:cxn>
+              <a:cxn ang="0">
+                <a:pos x="connsiteX8" y="connsiteY8"/>
+              </a:cxn>
+              <a:cxn ang="0">
+                <a:pos x="connsiteX9" y="connsiteY9"/>
+              </a:cxn>
+            </a:cxnLst>
+            <a:rect l="l" t="t" r="r" b="b"/>
+            <a:pathLst>
+              <a:path w="745051" h="814226">
+                <a:moveTo>
+                  <a:pt x="3213" y="1"/>
+                </a:moveTo>
+                <a:lnTo>
+                  <a:pt x="372523" y="1"/>
+                </a:lnTo>
+                <a:lnTo>
+                  <a:pt x="372523" y="814206"/>
+                </a:lnTo>
+                <a:lnTo>
+                  <a:pt x="372522" y="814206"/>
+                </a:lnTo>
+                <a:cubicBezTo>
+                  <a:pt x="166707" y="814206"/>
+                  <a:pt x="0" y="478350"/>
+                  <a:pt x="0" y="64193"/>
+                </a:cubicBezTo>
+                <a:close/>
+                <a:moveTo>
+                  <a:pt x="372524" y="0"/>
+                </a:moveTo>
+                <a:lnTo>
+                  <a:pt x="741837" y="0"/>
+                </a:lnTo>
+                <a:lnTo>
+                  <a:pt x="745051" y="64213"/>
+                </a:lnTo>
+                <a:cubicBezTo>
+                  <a:pt x="745051" y="478370"/>
+                  <a:pt x="578342" y="814226"/>
+                  <a:pt x="372525" y="814226"/>
+                </a:cubicBezTo>
+                <a:lnTo>
+                  <a:pt x="372524" y="814226"/>
+                </a:lnTo>
+                <a:close/>
+              </a:path>
+            </a:pathLst>
+          </a:custGeom>
+          <a:solidFill>
+            <a:schemeClr val="tx1">
+              <a:alpha val="25000"/>
+            </a:schemeClr>
+          </a:solidFill>
+          <a:ln>
+            <a:noFill/>
+          </a:ln>
+        </p:spPr>
+        <p:style>
+          <a:lnRef idx="2">
+            <a:schemeClr val="accent1">
+              <a:shade val="50000"/>
+            </a:schemeClr>
+          </a:lnRef>
+          <a:fillRef idx="1">
+            <a:schemeClr val="accent1"/>
+          </a:fillRef>
+          <a:effectRef idx="0">
+            <a:schemeClr val="accent1"/>
+          </a:effectRef>
+          <a:fontRef idx="minor">
+            <a:schemeClr val="lt1"/>
+          </a:fontRef>
+        </p:style>
+        <p:txBody>
+          <a:bodyPr wrap="square" rtlCol="0" anchor="ctr">
+            <a:noAutofit/>
+          </a:bodyPr>
+          <a:lstStyle/>
+          <a:p>
+            <a:pPr algn="ctr"/>
+            <a:endParaRPr lang="en-US" sz="1350"/>
+          </a:p>
+        </p:txBody>
+      </p:sp>
+      <p:sp>
+        <p:nvSpPr>
+          <p:cNvPr id="42" name="Freeform: Shape 41">
+            <a:extLst>
+              <a:ext uri="{FF2B5EF4-FFF2-40B4-BE49-F238E27FC236}">
+                <a16:creationId xmlns:a16="http://schemas.microsoft.com/office/drawing/2014/main" id="{316FCF1B-8E7F-4070-A42A-89C7A6E01114}"/>
+              </a:ext>
+            </a:extLst>
+          </p:cNvPr>
+          <p:cNvSpPr/>
+          <p:nvPr/>
+        </p:nvSpPr>
+        <p:spPr>
+          <a:xfrm>
+            <a:off x="4699368" y="3123665"/>
+            <a:ext cx="1676029" cy="610670"/>
+          </a:xfrm>
+          <a:custGeom>
+            <a:avLst/>
+            <a:gdLst>
+              <a:gd name="connsiteX0" fmla="*/ 369312 w 2234705"/>
+              <a:gd name="connsiteY0" fmla="*/ 0 h 814226"/>
+              <a:gd name="connsiteX1" fmla="*/ 2231491 w 2234705"/>
+              <a:gd name="connsiteY1" fmla="*/ 0 h 814226"/>
+              <a:gd name="connsiteX2" fmla="*/ 2234705 w 2234705"/>
+              <a:gd name="connsiteY2" fmla="*/ 64213 h 814226"/>
+              <a:gd name="connsiteX3" fmla="*/ 1862180 w 2234705"/>
+              <a:gd name="connsiteY3" fmla="*/ 814226 h 814226"/>
+              <a:gd name="connsiteX4" fmla="*/ 0 w 2234705"/>
+              <a:gd name="connsiteY4" fmla="*/ 814226 h 814226"/>
+              <a:gd name="connsiteX5" fmla="*/ 372526 w 2234705"/>
+              <a:gd name="connsiteY5" fmla="*/ 64213 h 814226"/>
+              <a:gd name="connsiteX6" fmla="*/ 369312 w 2234705"/>
+              <a:gd name="connsiteY6" fmla="*/ 0 h 814226"/>
+            </a:gdLst>
+            <a:ahLst/>
+            <a:cxnLst>
+              <a:cxn ang="0">
+                <a:pos x="connsiteX0" y="connsiteY0"/>
+              </a:cxn>
+              <a:cxn ang="0">
+                <a:pos x="connsiteX1" y="connsiteY1"/>
+              </a:cxn>
+              <a:cxn ang="0">
+                <a:pos x="connsiteX2" y="connsiteY2"/>
+              </a:cxn>
+              <a:cxn ang="0">
+                <a:pos x="connsiteX3" y="connsiteY3"/>
+              </a:cxn>
+              <a:cxn ang="0">
+                <a:pos x="connsiteX4" y="connsiteY4"/>
+              </a:cxn>
+              <a:cxn ang="0">
+                <a:pos x="connsiteX5" y="connsiteY5"/>
+              </a:cxn>
+              <a:cxn ang="0">
+                <a:pos x="connsiteX6" y="connsiteY6"/>
+              </a:cxn>
+            </a:cxnLst>
+            <a:rect l="l" t="t" r="r" b="b"/>
+            <a:pathLst>
+              <a:path w="2234705" h="814226">
+                <a:moveTo>
+                  <a:pt x="369312" y="0"/>
+                </a:moveTo>
+                <a:lnTo>
+                  <a:pt x="2231491" y="0"/>
+                </a:lnTo>
+                <a:lnTo>
+                  <a:pt x="2234705" y="64213"/>
+                </a:lnTo>
+                <a:cubicBezTo>
+                  <a:pt x="2234705" y="478370"/>
+                  <a:pt x="2067996" y="814226"/>
+                  <a:pt x="1862180" y="814226"/>
+                </a:cubicBezTo>
+                <a:lnTo>
+                  <a:pt x="0" y="814226"/>
+                </a:lnTo>
+                <a:cubicBezTo>
+                  <a:pt x="205817" y="814226"/>
+                  <a:pt x="372526" y="478370"/>
+                  <a:pt x="372526" y="64213"/>
+                </a:cubicBezTo>
+                <a:lnTo>
+                  <a:pt x="369312" y="0"/>
+                </a:lnTo>
+                <a:close/>
+              </a:path>
+            </a:pathLst>
+          </a:custGeom>
+          <a:solidFill>
+            <a:schemeClr val="tx1">
+              <a:alpha val="25000"/>
+            </a:schemeClr>
+          </a:solidFill>
+          <a:ln>
+            <a:noFill/>
+          </a:ln>
+        </p:spPr>
+        <p:style>
+          <a:lnRef idx="2">
+            <a:schemeClr val="accent1">
+              <a:shade val="50000"/>
+            </a:schemeClr>
+          </a:lnRef>
+          <a:fillRef idx="1">
+            <a:schemeClr val="accent1"/>
+          </a:fillRef>
+          <a:effectRef idx="0">
+            <a:schemeClr val="accent1"/>
+          </a:effectRef>
+          <a:fontRef idx="minor">
+            <a:schemeClr val="lt1"/>
+          </a:fontRef>
+        </p:style>
+        <p:txBody>
+          <a:bodyPr rtlCol="0" anchor="ctr"/>
+          <a:lstStyle/>
+          <a:p>
+            <a:pPr algn="ctr"/>
+            <a:endParaRPr lang="en-US" sz="1350"/>
+          </a:p>
+        </p:txBody>
+      </p:sp>
+      <p:sp>
+        <p:nvSpPr>
+          <p:cNvPr id="73" name="Freeform: Shape 72">
+            <a:extLst>
+              <a:ext uri="{FF2B5EF4-FFF2-40B4-BE49-F238E27FC236}">
+                <a16:creationId xmlns:a16="http://schemas.microsoft.com/office/drawing/2014/main" id="{106BDA61-0024-4CD8-8F95-0C1882332896}"/>
+              </a:ext>
+            </a:extLst>
+          </p:cNvPr>
+          <p:cNvSpPr/>
+          <p:nvPr/>
+        </p:nvSpPr>
+        <p:spPr>
+          <a:xfrm>
+            <a:off x="6463309" y="3123665"/>
+            <a:ext cx="1676029" cy="610670"/>
+          </a:xfrm>
+          <a:custGeom>
+            <a:avLst/>
+            <a:gdLst>
+              <a:gd name="connsiteX0" fmla="*/ 369312 w 2234705"/>
+              <a:gd name="connsiteY0" fmla="*/ 0 h 814226"/>
+              <a:gd name="connsiteX1" fmla="*/ 2231491 w 2234705"/>
+              <a:gd name="connsiteY1" fmla="*/ 0 h 814226"/>
+              <a:gd name="connsiteX2" fmla="*/ 2234705 w 2234705"/>
+              <a:gd name="connsiteY2" fmla="*/ 64213 h 814226"/>
+              <a:gd name="connsiteX3" fmla="*/ 1862180 w 2234705"/>
+              <a:gd name="connsiteY3" fmla="*/ 814226 h 814226"/>
+              <a:gd name="connsiteX4" fmla="*/ 0 w 2234705"/>
+              <a:gd name="connsiteY4" fmla="*/ 814226 h 814226"/>
+              <a:gd name="connsiteX5" fmla="*/ 372526 w 2234705"/>
+              <a:gd name="connsiteY5" fmla="*/ 64213 h 814226"/>
+              <a:gd name="connsiteX6" fmla="*/ 369312 w 2234705"/>
+              <a:gd name="connsiteY6" fmla="*/ 0 h 814226"/>
+            </a:gdLst>
+            <a:ahLst/>
+            <a:cxnLst>
+              <a:cxn ang="0">
+                <a:pos x="connsiteX0" y="connsiteY0"/>
+              </a:cxn>
+              <a:cxn ang="0">
+                <a:pos x="connsiteX1" y="connsiteY1"/>
+              </a:cxn>
+              <a:cxn ang="0">
+                <a:pos x="connsiteX2" y="connsiteY2"/>
+              </a:cxn>
+              <a:cxn ang="0">
+                <a:pos x="connsiteX3" y="connsiteY3"/>
+              </a:cxn>
+              <a:cxn ang="0">
+                <a:pos x="connsiteX4" y="connsiteY4"/>
+              </a:cxn>
+              <a:cxn ang="0">
+                <a:pos x="connsiteX5" y="connsiteY5"/>
+              </a:cxn>
+              <a:cxn ang="0">
+                <a:pos x="connsiteX6" y="connsiteY6"/>
+              </a:cxn>
+            </a:cxnLst>
+            <a:rect l="l" t="t" r="r" b="b"/>
+            <a:pathLst>
+              <a:path w="2234705" h="814226">
+                <a:moveTo>
+                  <a:pt x="369312" y="0"/>
+                </a:moveTo>
+                <a:lnTo>
+                  <a:pt x="2231491" y="0"/>
+                </a:lnTo>
+                <a:lnTo>
+                  <a:pt x="2234705" y="64213"/>
+                </a:lnTo>
+                <a:cubicBezTo>
+                  <a:pt x="2234705" y="478370"/>
+                  <a:pt x="2067996" y="814226"/>
+                  <a:pt x="1862180" y="814226"/>
+                </a:cubicBezTo>
+                <a:lnTo>
+                  <a:pt x="0" y="814226"/>
+                </a:lnTo>
+                <a:cubicBezTo>
+                  <a:pt x="205817" y="814226"/>
+                  <a:pt x="372526" y="478370"/>
+                  <a:pt x="372526" y="64213"/>
+                </a:cubicBezTo>
+                <a:lnTo>
+                  <a:pt x="369312" y="0"/>
+                </a:lnTo>
+                <a:close/>
+              </a:path>
+            </a:pathLst>
+          </a:custGeom>
+          <a:solidFill>
+            <a:schemeClr val="tx1">
+              <a:alpha val="25000"/>
+            </a:schemeClr>
+          </a:solidFill>
+          <a:ln>
+            <a:noFill/>
+          </a:ln>
+        </p:spPr>
+        <p:style>
+          <a:lnRef idx="2">
+            <a:schemeClr val="accent1">
+              <a:shade val="50000"/>
+            </a:schemeClr>
+          </a:lnRef>
+          <a:fillRef idx="1">
+            <a:schemeClr val="accent1"/>
+          </a:fillRef>
+          <a:effectRef idx="0">
+            <a:schemeClr val="accent1"/>
+          </a:effectRef>
+          <a:fontRef idx="minor">
+            <a:schemeClr val="lt1"/>
+          </a:fontRef>
+        </p:style>
+        <p:txBody>
+          <a:bodyPr rtlCol="0" anchor="ctr"/>
+          <a:lstStyle/>
+          <a:p>
+            <a:pPr algn="ctr"/>
+            <a:endParaRPr lang="en-US" sz="1350"/>
+          </a:p>
+        </p:txBody>
+      </p:sp>
+      <p:sp>
+        <p:nvSpPr>
+          <p:cNvPr id="74" name="Freeform: Shape 73">
+            <a:extLst>
+              <a:ext uri="{FF2B5EF4-FFF2-40B4-BE49-F238E27FC236}">
+                <a16:creationId xmlns:a16="http://schemas.microsoft.com/office/drawing/2014/main" id="{7886B4C2-1232-477C-940C-A33DBD0B9A59}"/>
+              </a:ext>
+            </a:extLst>
+          </p:cNvPr>
+          <p:cNvSpPr/>
+          <p:nvPr/>
+        </p:nvSpPr>
+        <p:spPr>
+          <a:xfrm>
+            <a:off x="8227249" y="3123665"/>
+            <a:ext cx="1676029" cy="610670"/>
+          </a:xfrm>
+          <a:custGeom>
+            <a:avLst/>
+            <a:gdLst>
+              <a:gd name="connsiteX0" fmla="*/ 369311 w 2234705"/>
+              <a:gd name="connsiteY0" fmla="*/ 0 h 814226"/>
+              <a:gd name="connsiteX1" fmla="*/ 2231491 w 2234705"/>
+              <a:gd name="connsiteY1" fmla="*/ 0 h 814226"/>
+              <a:gd name="connsiteX2" fmla="*/ 2234705 w 2234705"/>
+              <a:gd name="connsiteY2" fmla="*/ 64213 h 814226"/>
+              <a:gd name="connsiteX3" fmla="*/ 1862180 w 2234705"/>
+              <a:gd name="connsiteY3" fmla="*/ 814226 h 814226"/>
+              <a:gd name="connsiteX4" fmla="*/ 0 w 2234705"/>
+              <a:gd name="connsiteY4" fmla="*/ 814226 h 814226"/>
+              <a:gd name="connsiteX5" fmla="*/ 372525 w 2234705"/>
+              <a:gd name="connsiteY5" fmla="*/ 64213 h 814226"/>
+              <a:gd name="connsiteX6" fmla="*/ 369311 w 2234705"/>
+              <a:gd name="connsiteY6" fmla="*/ 0 h 814226"/>
+            </a:gdLst>
+            <a:ahLst/>
+            <a:cxnLst>
+              <a:cxn ang="0">
+                <a:pos x="connsiteX0" y="connsiteY0"/>
+              </a:cxn>
+              <a:cxn ang="0">
+                <a:pos x="connsiteX1" y="connsiteY1"/>
+              </a:cxn>
+              <a:cxn ang="0">
+                <a:pos x="connsiteX2" y="connsiteY2"/>
+              </a:cxn>
+              <a:cxn ang="0">
+                <a:pos x="connsiteX3" y="connsiteY3"/>
+              </a:cxn>
+              <a:cxn ang="0">
+                <a:pos x="connsiteX4" y="connsiteY4"/>
+              </a:cxn>
+              <a:cxn ang="0">
+                <a:pos x="connsiteX5" y="connsiteY5"/>
+              </a:cxn>
+              <a:cxn ang="0">
+                <a:pos x="connsiteX6" y="connsiteY6"/>
+              </a:cxn>
+            </a:cxnLst>
+            <a:rect l="l" t="t" r="r" b="b"/>
+            <a:pathLst>
+              <a:path w="2234705" h="814226">
+                <a:moveTo>
+                  <a:pt x="369311" y="0"/>
+                </a:moveTo>
+                <a:lnTo>
+                  <a:pt x="2231491" y="0"/>
+                </a:lnTo>
+                <a:lnTo>
+                  <a:pt x="2234705" y="64213"/>
+                </a:lnTo>
+                <a:cubicBezTo>
+                  <a:pt x="2234705" y="478370"/>
+                  <a:pt x="2067996" y="814226"/>
+                  <a:pt x="1862180" y="814226"/>
+                </a:cubicBezTo>
+                <a:lnTo>
+                  <a:pt x="0" y="814226"/>
+                </a:lnTo>
+                <a:cubicBezTo>
+                  <a:pt x="205816" y="814226"/>
+                  <a:pt x="372525" y="478370"/>
+                  <a:pt x="372525" y="64213"/>
+                </a:cubicBezTo>
+                <a:lnTo>
+                  <a:pt x="369311" y="0"/>
+                </a:lnTo>
+                <a:close/>
+              </a:path>
+            </a:pathLst>
+          </a:custGeom>
+          <a:solidFill>
+            <a:schemeClr val="tx1">
+              <a:alpha val="25000"/>
+            </a:schemeClr>
+          </a:solidFill>
+          <a:ln>
+            <a:noFill/>
+          </a:ln>
+        </p:spPr>
+        <p:style>
+          <a:lnRef idx="2">
+            <a:schemeClr val="accent1">
+              <a:shade val="50000"/>
+            </a:schemeClr>
+          </a:lnRef>
+          <a:fillRef idx="1">
+            <a:schemeClr val="accent1"/>
+          </a:fillRef>
+          <a:effectRef idx="0">
+            <a:schemeClr val="accent1"/>
+          </a:effectRef>
+          <a:fontRef idx="minor">
+            <a:schemeClr val="lt1"/>
+          </a:fontRef>
+        </p:style>
+        <p:txBody>
+          <a:bodyPr rtlCol="0" anchor="ctr"/>
+          <a:lstStyle/>
+          <a:p>
+            <a:pPr algn="ctr"/>
+            <a:endParaRPr lang="en-US" sz="1350"/>
+          </a:p>
+        </p:txBody>
+      </p:sp>
+      <p:pic>
+        <p:nvPicPr>
+          <p:cNvPr id="75" name="Graphic 74" descr="Users">
+            <a:extLst>
+              <a:ext uri="{FF2B5EF4-FFF2-40B4-BE49-F238E27FC236}">
+                <a16:creationId xmlns:a16="http://schemas.microsoft.com/office/drawing/2014/main" id="{E8BB70D9-E3EB-4B8C-AA31-DF467449F212}"/>
+              </a:ext>
+            </a:extLst>
+          </p:cNvPr>
+          <p:cNvPicPr>
+            <a:picLocks noChangeAspect="1"/>
+          </p:cNvPicPr>
+          <p:nvPr/>
+        </p:nvPicPr>
+        <p:blipFill>
+          <a:blip r:embed="rId3">
+            <a:extLst>
+              <a:ext uri="{28A0092B-C50C-407E-A947-70E740481C1C}">
+                <a14:useLocalDpi xmlns:a14="http://schemas.microsoft.com/office/drawing/2010/main" val="0"/>
+              </a:ext>
+              <a:ext uri="{96DAC541-7B7A-43D3-8B79-37D633B846F1}">
+                <asvg:svgBlip xmlns:asvg="http://schemas.microsoft.com/office/drawing/2016/SVG/main" r:embed="rId4"/>
+              </a:ext>
+            </a:extLst>
+          </a:blip>
+          <a:stretch>
+            <a:fillRect/>
+          </a:stretch>
+        </p:blipFill>
+        <p:spPr>
+          <a:xfrm>
+            <a:off x="8826305" y="3190646"/>
+            <a:ext cx="477914" cy="477914"/>
+          </a:xfrm>
+          <a:prstGeom prst="rect">
+            <a:avLst/>
+          </a:prstGeom>
+        </p:spPr>
+      </p:pic>
+      <p:pic>
+        <p:nvPicPr>
+          <p:cNvPr id="76" name="Graphic 75" descr="Puzzle">
+            <a:extLst>
+              <a:ext uri="{FF2B5EF4-FFF2-40B4-BE49-F238E27FC236}">
+                <a16:creationId xmlns:a16="http://schemas.microsoft.com/office/drawing/2014/main" id="{0C654B2F-CC56-482D-95CC-56BFB3835B85}"/>
+              </a:ext>
+            </a:extLst>
+          </p:cNvPr>
+          <p:cNvPicPr>
+            <a:picLocks noChangeAspect="1"/>
+          </p:cNvPicPr>
+          <p:nvPr/>
+        </p:nvPicPr>
+        <p:blipFill>
+          <a:blip r:embed="rId5">
+            <a:extLst>
+              <a:ext uri="{28A0092B-C50C-407E-A947-70E740481C1C}">
+                <a14:useLocalDpi xmlns:a14="http://schemas.microsoft.com/office/drawing/2010/main" val="0"/>
+              </a:ext>
+              <a:ext uri="{96DAC541-7B7A-43D3-8B79-37D633B846F1}">
+                <asvg:svgBlip xmlns:asvg="http://schemas.microsoft.com/office/drawing/2016/SVG/main" r:embed="rId6"/>
+              </a:ext>
+            </a:extLst>
+          </a:blip>
+          <a:stretch>
+            <a:fillRect/>
+          </a:stretch>
+        </p:blipFill>
+        <p:spPr>
+          <a:xfrm>
+            <a:off x="7062365" y="3190036"/>
+            <a:ext cx="477914" cy="477914"/>
+          </a:xfrm>
+          <a:prstGeom prst="rect">
+            <a:avLst/>
+          </a:prstGeom>
+        </p:spPr>
+      </p:pic>
+      <p:sp>
+        <p:nvSpPr>
+          <p:cNvPr id="3" name="Rectangle 2">
+            <a:extLst>
+              <a:ext uri="{FF2B5EF4-FFF2-40B4-BE49-F238E27FC236}">
+                <a16:creationId xmlns:a16="http://schemas.microsoft.com/office/drawing/2014/main" id="{573119E1-E683-4300-94E8-40B224723B59}"/>
+              </a:ext>
+            </a:extLst>
+          </p:cNvPr>
+          <p:cNvSpPr/>
+          <p:nvPr/>
+        </p:nvSpPr>
+        <p:spPr>
+          <a:xfrm>
+            <a:off x="3258292" y="2730198"/>
+            <a:ext cx="1160574" cy="300082"/>
+          </a:xfrm>
+          <a:prstGeom prst="rect">
+            <a:avLst/>
+          </a:prstGeom>
+        </p:spPr>
+        <p:txBody>
+          <a:bodyPr wrap="none" anchor="ctr">
+            <a:spAutoFit/>
+          </a:bodyPr>
+          <a:lstStyle/>
+          <a:p>
+            <a:pPr algn="ctr"/>
+            <a:r>
+              <a:rPr lang="en-US" sz="1350" b="1" noProof="1">
+                <a:solidFill>
+                  <a:schemeClr val="bg1"/>
+                </a:solidFill>
+              </a:rPr>
+              <a:t>Web Scraping</a:t>
+            </a:r>
+          </a:p>
+        </p:txBody>
+      </p:sp>
+      <p:sp>
+        <p:nvSpPr>
+          <p:cNvPr id="79" name="Rectangle 78">
+            <a:extLst>
+              <a:ext uri="{FF2B5EF4-FFF2-40B4-BE49-F238E27FC236}">
+                <a16:creationId xmlns:a16="http://schemas.microsoft.com/office/drawing/2014/main" id="{AAA16C34-F198-4B00-80F7-19AFD169D0DE}"/>
+              </a:ext>
+            </a:extLst>
+          </p:cNvPr>
+          <p:cNvSpPr/>
+          <p:nvPr/>
+        </p:nvSpPr>
+        <p:spPr>
+          <a:xfrm>
+            <a:off x="5040886" y="2715910"/>
+            <a:ext cx="1195840" cy="300082"/>
+          </a:xfrm>
+          <a:prstGeom prst="rect">
+            <a:avLst/>
+          </a:prstGeom>
+        </p:spPr>
+        <p:txBody>
+          <a:bodyPr wrap="none" anchor="ctr">
+            <a:spAutoFit/>
+          </a:bodyPr>
+          <a:lstStyle/>
+          <a:p>
+            <a:pPr algn="ctr"/>
+            <a:r>
+              <a:rPr lang="en-US" sz="1350" b="1" noProof="1"/>
+              <a:t>Staging Tables</a:t>
+            </a:r>
+          </a:p>
+        </p:txBody>
+      </p:sp>
+      <p:sp>
+        <p:nvSpPr>
+          <p:cNvPr id="80" name="Rectangle 79">
+            <a:extLst>
+              <a:ext uri="{FF2B5EF4-FFF2-40B4-BE49-F238E27FC236}">
+                <a16:creationId xmlns:a16="http://schemas.microsoft.com/office/drawing/2014/main" id="{864C9AAC-025C-49B4-AA72-E4F9F36DA145}"/>
+              </a:ext>
+            </a:extLst>
+          </p:cNvPr>
+          <p:cNvSpPr/>
+          <p:nvPr/>
+        </p:nvSpPr>
+        <p:spPr>
+          <a:xfrm>
+            <a:off x="6964884" y="2715910"/>
+            <a:ext cx="910186" cy="300082"/>
+          </a:xfrm>
+          <a:prstGeom prst="rect">
+            <a:avLst/>
+          </a:prstGeom>
+        </p:spPr>
+        <p:txBody>
+          <a:bodyPr wrap="none" anchor="ctr">
+            <a:spAutoFit/>
+          </a:bodyPr>
+          <a:lstStyle/>
+          <a:p>
+            <a:pPr algn="ctr"/>
+            <a:r>
+              <a:rPr lang="en-US" sz="1350" b="1" noProof="1"/>
+              <a:t>Transform</a:t>
+            </a:r>
+          </a:p>
+        </p:txBody>
+      </p:sp>
+      <p:sp>
+        <p:nvSpPr>
+          <p:cNvPr id="81" name="Rectangle 80">
+            <a:extLst>
+              <a:ext uri="{FF2B5EF4-FFF2-40B4-BE49-F238E27FC236}">
+                <a16:creationId xmlns:a16="http://schemas.microsoft.com/office/drawing/2014/main" id="{4730A568-DE8E-477C-A1D9-E4408746D321}"/>
+              </a:ext>
+            </a:extLst>
+          </p:cNvPr>
+          <p:cNvSpPr/>
+          <p:nvPr/>
+        </p:nvSpPr>
+        <p:spPr>
+          <a:xfrm>
+            <a:off x="8879345" y="2715910"/>
+            <a:ext cx="529312" cy="300082"/>
+          </a:xfrm>
+          <a:prstGeom prst="rect">
+            <a:avLst/>
+          </a:prstGeom>
+        </p:spPr>
+        <p:txBody>
+          <a:bodyPr wrap="none" anchor="ctr">
+            <a:spAutoFit/>
+          </a:bodyPr>
+          <a:lstStyle/>
+          <a:p>
+            <a:pPr algn="ctr"/>
+            <a:r>
+              <a:rPr lang="en-US" sz="1350" b="1" noProof="1">
+                <a:solidFill>
+                  <a:schemeClr val="bg1"/>
+                </a:solidFill>
+              </a:rPr>
+              <a:t>Load</a:t>
+            </a:r>
+          </a:p>
+        </p:txBody>
+      </p:sp>
+      <p:sp>
+        <p:nvSpPr>
+          <p:cNvPr id="4" name="Rectangle 3">
+            <a:extLst>
+              <a:ext uri="{FF2B5EF4-FFF2-40B4-BE49-F238E27FC236}">
+                <a16:creationId xmlns:a16="http://schemas.microsoft.com/office/drawing/2014/main" id="{CA9B8B4C-3B51-4049-A2C4-69D93FC81667}"/>
+              </a:ext>
+            </a:extLst>
+          </p:cNvPr>
+          <p:cNvSpPr/>
+          <p:nvPr/>
+        </p:nvSpPr>
+        <p:spPr>
+          <a:xfrm>
+            <a:off x="2737301" y="4010904"/>
+            <a:ext cx="1676029" cy="707886"/>
+          </a:xfrm>
+          <a:prstGeom prst="rect">
+            <a:avLst/>
+          </a:prstGeom>
+        </p:spPr>
+        <p:txBody>
+          <a:bodyPr wrap="square">
+            <a:spAutoFit/>
+          </a:bodyPr>
+          <a:lstStyle/>
+          <a:p>
+            <a:pPr algn="ctr"/>
+            <a:r>
+              <a:rPr lang="en-US" sz="2000" noProof="1">
+                <a:solidFill>
+                  <a:schemeClr val="tx1">
+                    <a:lumMod val="65000"/>
+                    <a:lumOff val="35000"/>
+                  </a:schemeClr>
+                </a:solidFill>
+              </a:rPr>
+              <a:t>279.1 Seconds</a:t>
+            </a:r>
+          </a:p>
+          <a:p>
+            <a:pPr algn="ctr"/>
+            <a:r>
+              <a:rPr lang="en-US" sz="2000" noProof="1">
+                <a:solidFill>
+                  <a:schemeClr val="tx1">
+                    <a:lumMod val="65000"/>
+                    <a:lumOff val="35000"/>
+                  </a:schemeClr>
+                </a:solidFill>
+              </a:rPr>
+              <a:t>69.7% </a:t>
+            </a:r>
+          </a:p>
+        </p:txBody>
+      </p:sp>
+      <p:sp>
+        <p:nvSpPr>
+          <p:cNvPr id="82" name="Rectangle 81">
+            <a:extLst>
+              <a:ext uri="{FF2B5EF4-FFF2-40B4-BE49-F238E27FC236}">
+                <a16:creationId xmlns:a16="http://schemas.microsoft.com/office/drawing/2014/main" id="{5DA32DE4-0E98-4728-A0AA-51A4E4A2D9EF}"/>
+              </a:ext>
+            </a:extLst>
+          </p:cNvPr>
+          <p:cNvSpPr/>
+          <p:nvPr/>
+        </p:nvSpPr>
+        <p:spPr>
+          <a:xfrm>
+            <a:off x="4699367" y="4010904"/>
+            <a:ext cx="1477905" cy="1015663"/>
+          </a:xfrm>
+          <a:prstGeom prst="rect">
+            <a:avLst/>
+          </a:prstGeom>
+        </p:spPr>
+        <p:txBody>
+          <a:bodyPr wrap="square">
+            <a:spAutoFit/>
+          </a:bodyPr>
+          <a:lstStyle/>
+          <a:p>
+            <a:pPr algn="ctr"/>
+            <a:r>
+              <a:rPr lang="en-US" sz="2000" noProof="1">
+                <a:solidFill>
+                  <a:schemeClr val="tx1">
+                    <a:lumMod val="65000"/>
+                    <a:lumOff val="35000"/>
+                  </a:schemeClr>
+                </a:solidFill>
+              </a:rPr>
+              <a:t>64 Seconds</a:t>
+            </a:r>
+          </a:p>
+          <a:p>
+            <a:pPr algn="ctr"/>
+            <a:r>
+              <a:rPr lang="en-US" sz="2000" noProof="1">
+                <a:solidFill>
+                  <a:schemeClr val="tx1">
+                    <a:lumMod val="65000"/>
+                    <a:lumOff val="35000"/>
+                  </a:schemeClr>
+                </a:solidFill>
+              </a:rPr>
+              <a:t>16%</a:t>
+            </a:r>
+          </a:p>
+          <a:p>
+            <a:pPr algn="ctr"/>
+            <a:endParaRPr lang="en-US" sz="2000" noProof="1">
+              <a:solidFill>
+                <a:schemeClr val="tx1">
+                  <a:lumMod val="65000"/>
+                  <a:lumOff val="35000"/>
+                </a:schemeClr>
+              </a:solidFill>
+            </a:endParaRPr>
+          </a:p>
+        </p:txBody>
+      </p:sp>
+      <p:sp>
+        <p:nvSpPr>
+          <p:cNvPr id="83" name="Rectangle 82">
+            <a:extLst>
+              <a:ext uri="{FF2B5EF4-FFF2-40B4-BE49-F238E27FC236}">
+                <a16:creationId xmlns:a16="http://schemas.microsoft.com/office/drawing/2014/main" id="{CED8022D-0ED8-487A-991F-F469271475FE}"/>
+              </a:ext>
+            </a:extLst>
+          </p:cNvPr>
+          <p:cNvSpPr/>
+          <p:nvPr/>
+        </p:nvSpPr>
+        <p:spPr>
+          <a:xfrm>
+            <a:off x="6463309" y="4010904"/>
+            <a:ext cx="1477905" cy="415498"/>
+          </a:xfrm>
+          <a:prstGeom prst="rect">
+            <a:avLst/>
+          </a:prstGeom>
+        </p:spPr>
+        <p:txBody>
+          <a:bodyPr wrap="square">
+            <a:spAutoFit/>
+          </a:bodyPr>
+          <a:lstStyle/>
+          <a:p>
+            <a:pPr algn="ctr"/>
+            <a:r>
+              <a:rPr lang="en-US" sz="2000" noProof="1">
+                <a:solidFill>
+                  <a:schemeClr val="tx1">
+                    <a:lumMod val="65000"/>
+                    <a:lumOff val="35000"/>
+                  </a:schemeClr>
+                </a:solidFill>
+              </a:rPr>
+              <a:t>1.9 Seconds</a:t>
+            </a:r>
+          </a:p>
+          <a:p>
+            <a:pPr algn="ctr"/>
+            <a:r>
+              <a:rPr lang="en-US" sz="2000" noProof="1">
+                <a:solidFill>
+                  <a:schemeClr val="tx1">
+                    <a:lumMod val="65000"/>
+                    <a:lumOff val="35000"/>
+                  </a:schemeClr>
+                </a:solidFill>
+              </a:rPr>
+              <a:t>0.48%</a:t>
+            </a:r>
+          </a:p>
+        </p:txBody>
+      </p:sp>
+      <p:sp>
+        <p:nvSpPr>
+          <p:cNvPr id="84" name="Rectangle 83">
+            <a:extLst>
+              <a:ext uri="{FF2B5EF4-FFF2-40B4-BE49-F238E27FC236}">
+                <a16:creationId xmlns:a16="http://schemas.microsoft.com/office/drawing/2014/main" id="{AB6E719E-CDA3-44A2-B961-8DBD808EF949}"/>
+              </a:ext>
+            </a:extLst>
+          </p:cNvPr>
+          <p:cNvSpPr/>
+          <p:nvPr/>
+        </p:nvSpPr>
+        <p:spPr>
+          <a:xfrm>
+            <a:off x="8227250" y="4010904"/>
+            <a:ext cx="1581768" cy="1015663"/>
+          </a:xfrm>
+          <a:prstGeom prst="rect">
+            <a:avLst/>
+          </a:prstGeom>
+        </p:spPr>
+        <p:txBody>
+          <a:bodyPr wrap="square">
+            <a:spAutoFit/>
+          </a:bodyPr>
+          <a:lstStyle/>
+          <a:p>
+            <a:pPr algn="ctr"/>
+            <a:r>
+              <a:rPr lang="en-US" sz="2000" noProof="1">
+                <a:solidFill>
+                  <a:schemeClr val="tx1">
+                    <a:lumMod val="65000"/>
+                    <a:lumOff val="35000"/>
+                  </a:schemeClr>
+                </a:solidFill>
+              </a:rPr>
+              <a:t>55 Seconds</a:t>
+            </a:r>
+          </a:p>
+          <a:p>
+            <a:pPr algn="ctr"/>
+            <a:r>
+              <a:rPr lang="en-US" sz="2000" noProof="1">
+                <a:solidFill>
+                  <a:schemeClr val="tx1">
+                    <a:lumMod val="65000"/>
+                    <a:lumOff val="35000"/>
+                  </a:schemeClr>
+                </a:solidFill>
+              </a:rPr>
+              <a:t>13.8%</a:t>
+            </a:r>
+          </a:p>
+          <a:p>
+            <a:pPr algn="ctr"/>
+            <a:endParaRPr lang="en-US" sz="2000" noProof="1">
+              <a:solidFill>
+                <a:schemeClr val="tx1">
+                  <a:lumMod val="65000"/>
+                  <a:lumOff val="35000"/>
+                </a:schemeClr>
+              </a:solidFill>
+            </a:endParaRPr>
+          </a:p>
+        </p:txBody>
+      </p:sp>
+      <p:sp>
+        <p:nvSpPr>
+          <p:cNvPr id="5" name="Oval 4">
+            <a:extLst>
+              <a:ext uri="{FF2B5EF4-FFF2-40B4-BE49-F238E27FC236}">
+                <a16:creationId xmlns:a16="http://schemas.microsoft.com/office/drawing/2014/main" id="{8D27A606-C1D5-42A8-9908-40B955ADEC0F}"/>
+              </a:ext>
+            </a:extLst>
+          </p:cNvPr>
+          <p:cNvSpPr/>
+          <p:nvPr/>
+        </p:nvSpPr>
+        <p:spPr>
+          <a:xfrm>
+            <a:off x="3495828" y="1872590"/>
+            <a:ext cx="561538" cy="561538"/>
+          </a:xfrm>
+          <a:prstGeom prst="ellipse">
+            <a:avLst/>
+          </a:prstGeom>
+          <a:solidFill>
+            <a:schemeClr val="bg1"/>
+          </a:solidFill>
+          <a:ln>
+            <a:noFill/>
+          </a:ln>
+          <a:effectLst>
+            <a:outerShdw blurRad="50800" dist="38100" dir="2700000" algn="tl" rotWithShape="0">
+              <a:prstClr val="black">
+                <a:alpha val="40000"/>
+              </a:prstClr>
+            </a:outerShdw>
+          </a:effectLst>
+        </p:spPr>
+        <p:style>
+          <a:lnRef idx="2">
+            <a:schemeClr val="accent1">
+              <a:shade val="50000"/>
+            </a:schemeClr>
+          </a:lnRef>
+          <a:fillRef idx="1">
+            <a:schemeClr val="accent1"/>
+          </a:fillRef>
+          <a:effectRef idx="0">
+            <a:schemeClr val="accent1"/>
+          </a:effectRef>
+          <a:fontRef idx="minor">
+            <a:schemeClr val="lt1"/>
+          </a:fontRef>
+        </p:style>
+        <p:txBody>
+          <a:bodyPr rot="0" spcFirstLastPara="0" vertOverflow="overflow" horzOverflow="overflow" vert="horz" wrap="square" lIns="68580" tIns="34290" rIns="68580" bIns="34290" numCol="1" spcCol="0" rtlCol="0" fromWordArt="0" anchor="ctr" anchorCtr="0" forceAA="0" compatLnSpc="1">
+            <a:prstTxWarp prst="textNoShape">
+              <a:avLst/>
+            </a:prstTxWarp>
+            <a:noAutofit/>
+          </a:bodyPr>
+          <a:lstStyle/>
+          <a:p>
+            <a:pPr algn="ctr"/>
+            <a:r>
+              <a:rPr lang="en-US" sz="2400" b="1" dirty="0">
+                <a:solidFill>
+                  <a:schemeClr val="tx1">
+                    <a:lumMod val="85000"/>
+                    <a:lumOff val="15000"/>
+                  </a:schemeClr>
+                </a:solidFill>
+              </a:rPr>
+              <a:t>1</a:t>
+            </a:r>
+          </a:p>
+        </p:txBody>
+      </p:sp>
+      <p:sp>
+        <p:nvSpPr>
+          <p:cNvPr id="90" name="Oval 89">
+            <a:extLst>
+              <a:ext uri="{FF2B5EF4-FFF2-40B4-BE49-F238E27FC236}">
+                <a16:creationId xmlns:a16="http://schemas.microsoft.com/office/drawing/2014/main" id="{315ACA7B-41E6-437B-A950-6FBDDA323A62}"/>
+              </a:ext>
+            </a:extLst>
+          </p:cNvPr>
+          <p:cNvSpPr/>
+          <p:nvPr/>
+        </p:nvSpPr>
+        <p:spPr>
+          <a:xfrm>
+            <a:off x="5258716" y="1872590"/>
+            <a:ext cx="561538" cy="561538"/>
+          </a:xfrm>
+          <a:prstGeom prst="ellipse">
+            <a:avLst/>
+          </a:prstGeom>
+          <a:solidFill>
+            <a:schemeClr val="bg1"/>
+          </a:solidFill>
+          <a:ln>
+            <a:noFill/>
+          </a:ln>
+          <a:effectLst>
+            <a:outerShdw blurRad="50800" dist="38100" dir="2700000" algn="tl" rotWithShape="0">
+              <a:prstClr val="black">
+                <a:alpha val="40000"/>
+              </a:prstClr>
+            </a:outerShdw>
+          </a:effectLst>
+        </p:spPr>
+        <p:style>
+          <a:lnRef idx="2">
+            <a:schemeClr val="accent1">
+              <a:shade val="50000"/>
+            </a:schemeClr>
+          </a:lnRef>
+          <a:fillRef idx="1">
+            <a:schemeClr val="accent1"/>
+          </a:fillRef>
+          <a:effectRef idx="0">
+            <a:schemeClr val="accent1"/>
+          </a:effectRef>
+          <a:fontRef idx="minor">
+            <a:schemeClr val="lt1"/>
+          </a:fontRef>
+        </p:style>
+        <p:txBody>
+          <a:bodyPr rot="0" spcFirstLastPara="0" vertOverflow="overflow" horzOverflow="overflow" vert="horz" wrap="square" lIns="68580" tIns="34290" rIns="68580" bIns="34290" numCol="1" spcCol="0" rtlCol="0" fromWordArt="0" anchor="ctr" anchorCtr="0" forceAA="0" compatLnSpc="1">
+            <a:prstTxWarp prst="textNoShape">
+              <a:avLst/>
+            </a:prstTxWarp>
+            <a:noAutofit/>
+          </a:bodyPr>
+          <a:lstStyle/>
+          <a:p>
+            <a:pPr algn="ctr"/>
+            <a:r>
+              <a:rPr lang="en-US" sz="2400" b="1" dirty="0">
+                <a:solidFill>
+                  <a:schemeClr val="tx1">
+                    <a:lumMod val="85000"/>
+                    <a:lumOff val="15000"/>
+                  </a:schemeClr>
+                </a:solidFill>
+              </a:rPr>
+              <a:t>2</a:t>
+            </a:r>
+          </a:p>
+        </p:txBody>
+      </p:sp>
+      <p:sp>
+        <p:nvSpPr>
+          <p:cNvPr id="91" name="Oval 90">
+            <a:extLst>
+              <a:ext uri="{FF2B5EF4-FFF2-40B4-BE49-F238E27FC236}">
+                <a16:creationId xmlns:a16="http://schemas.microsoft.com/office/drawing/2014/main" id="{C81407A6-2A16-4654-B90C-AB8230DB8DC7}"/>
+              </a:ext>
+            </a:extLst>
+          </p:cNvPr>
+          <p:cNvSpPr/>
+          <p:nvPr/>
+        </p:nvSpPr>
+        <p:spPr>
+          <a:xfrm>
+            <a:off x="7021605" y="1872590"/>
+            <a:ext cx="561538" cy="561538"/>
+          </a:xfrm>
+          <a:prstGeom prst="ellipse">
+            <a:avLst/>
+          </a:prstGeom>
+          <a:solidFill>
+            <a:schemeClr val="bg1"/>
+          </a:solidFill>
+          <a:ln>
+            <a:noFill/>
+          </a:ln>
+          <a:effectLst>
+            <a:outerShdw blurRad="50800" dist="38100" dir="2700000" algn="tl" rotWithShape="0">
+              <a:prstClr val="black">
+                <a:alpha val="40000"/>
+              </a:prstClr>
+            </a:outerShdw>
+          </a:effectLst>
+        </p:spPr>
+        <p:style>
+          <a:lnRef idx="2">
+            <a:schemeClr val="accent1">
+              <a:shade val="50000"/>
+            </a:schemeClr>
+          </a:lnRef>
+          <a:fillRef idx="1">
+            <a:schemeClr val="accent1"/>
+          </a:fillRef>
+          <a:effectRef idx="0">
+            <a:schemeClr val="accent1"/>
+          </a:effectRef>
+          <a:fontRef idx="minor">
+            <a:schemeClr val="lt1"/>
+          </a:fontRef>
+        </p:style>
+        <p:txBody>
+          <a:bodyPr rot="0" spcFirstLastPara="0" vertOverflow="overflow" horzOverflow="overflow" vert="horz" wrap="square" lIns="68580" tIns="34290" rIns="68580" bIns="34290" numCol="1" spcCol="0" rtlCol="0" fromWordArt="0" anchor="ctr" anchorCtr="0" forceAA="0" compatLnSpc="1">
+            <a:prstTxWarp prst="textNoShape">
+              <a:avLst/>
+            </a:prstTxWarp>
+            <a:noAutofit/>
+          </a:bodyPr>
+          <a:lstStyle/>
+          <a:p>
+            <a:pPr algn="ctr"/>
+            <a:r>
+              <a:rPr lang="en-US" sz="2400" b="1" dirty="0">
+                <a:solidFill>
+                  <a:schemeClr val="tx1">
+                    <a:lumMod val="85000"/>
+                    <a:lumOff val="15000"/>
+                  </a:schemeClr>
+                </a:solidFill>
+              </a:rPr>
+              <a:t>3</a:t>
+            </a:r>
+          </a:p>
+        </p:txBody>
+      </p:sp>
+      <p:sp>
+        <p:nvSpPr>
+          <p:cNvPr id="92" name="Oval 91">
+            <a:extLst>
+              <a:ext uri="{FF2B5EF4-FFF2-40B4-BE49-F238E27FC236}">
+                <a16:creationId xmlns:a16="http://schemas.microsoft.com/office/drawing/2014/main" id="{105ABC92-3331-490F-868D-BE155D391C38}"/>
+              </a:ext>
+            </a:extLst>
+          </p:cNvPr>
+          <p:cNvSpPr/>
+          <p:nvPr/>
+        </p:nvSpPr>
+        <p:spPr>
+          <a:xfrm>
+            <a:off x="8784493" y="1872590"/>
+            <a:ext cx="561538" cy="561538"/>
+          </a:xfrm>
+          <a:prstGeom prst="ellipse">
+            <a:avLst/>
+          </a:prstGeom>
+          <a:solidFill>
+            <a:schemeClr val="bg1"/>
+          </a:solidFill>
+          <a:ln>
+            <a:noFill/>
+          </a:ln>
+          <a:effectLst>
+            <a:outerShdw blurRad="50800" dist="38100" dir="2700000" algn="tl" rotWithShape="0">
+              <a:prstClr val="black">
+                <a:alpha val="40000"/>
+              </a:prstClr>
+            </a:outerShdw>
+          </a:effectLst>
+        </p:spPr>
+        <p:style>
+          <a:lnRef idx="2">
+            <a:schemeClr val="accent1">
+              <a:shade val="50000"/>
+            </a:schemeClr>
+          </a:lnRef>
+          <a:fillRef idx="1">
+            <a:schemeClr val="accent1"/>
+          </a:fillRef>
+          <a:effectRef idx="0">
+            <a:schemeClr val="accent1"/>
+          </a:effectRef>
+          <a:fontRef idx="minor">
+            <a:schemeClr val="lt1"/>
+          </a:fontRef>
+        </p:style>
+        <p:txBody>
+          <a:bodyPr rot="0" spcFirstLastPara="0" vertOverflow="overflow" horzOverflow="overflow" vert="horz" wrap="square" lIns="68580" tIns="34290" rIns="68580" bIns="34290" numCol="1" spcCol="0" rtlCol="0" fromWordArt="0" anchor="ctr" anchorCtr="0" forceAA="0" compatLnSpc="1">
+            <a:prstTxWarp prst="textNoShape">
+              <a:avLst/>
+            </a:prstTxWarp>
+            <a:noAutofit/>
+          </a:bodyPr>
+          <a:lstStyle/>
+          <a:p>
+            <a:pPr algn="ctr"/>
+            <a:r>
+              <a:rPr lang="en-US" sz="2400" b="1" dirty="0">
+                <a:solidFill>
+                  <a:schemeClr val="tx1">
+                    <a:lumMod val="85000"/>
+                    <a:lumOff val="15000"/>
+                  </a:schemeClr>
+                </a:solidFill>
+              </a:rPr>
+              <a:t>4</a:t>
+            </a:r>
+          </a:p>
+        </p:txBody>
+      </p:sp>
+      <p:pic>
+        <p:nvPicPr>
+          <p:cNvPr id="1026" name="Picture 2" descr="Web Scraping Demo From NextStep 2019 - Overview | OutSystems">
+            <a:extLst>
+              <a:ext uri="{FF2B5EF4-FFF2-40B4-BE49-F238E27FC236}">
+                <a16:creationId xmlns:a16="http://schemas.microsoft.com/office/drawing/2014/main" id="{DB76237C-0650-C860-E301-1C9312FBD8C9}"/>
+              </a:ext>
+            </a:extLst>
+          </p:cNvPr>
+          <p:cNvPicPr>
+            <a:picLocks noChangeAspect="1" noChangeArrowheads="1"/>
+          </p:cNvPicPr>
+          <p:nvPr/>
+        </p:nvPicPr>
+        <p:blipFill>
+          <a:blip r:embed="rId7">
+            <a:extLst>
+              <a:ext uri="{28A0092B-C50C-407E-A947-70E740481C1C}">
+                <a14:useLocalDpi xmlns:a14="http://schemas.microsoft.com/office/drawing/2010/main" val="0"/>
+              </a:ext>
+            </a:extLst>
+          </a:blip>
+          <a:srcRect/>
+          <a:stretch>
+            <a:fillRect/>
+          </a:stretch>
+        </p:blipFill>
+        <p:spPr bwMode="auto">
+          <a:xfrm>
+            <a:off x="3409281" y="3042155"/>
+            <a:ext cx="702964" cy="702964"/>
+          </a:xfrm>
+          <a:prstGeom prst="rect">
+            <a:avLst/>
+          </a:prstGeom>
+          <a:noFill/>
+          <a:extLst>
+            <a:ext uri="{909E8E84-426E-40DD-AFC4-6F175D3DCCD1}">
+              <a14:hiddenFill xmlns:a14="http://schemas.microsoft.com/office/drawing/2010/main">
+                <a:solidFill>
+                  <a:srgbClr val="FFFFFF"/>
+                </a:solidFill>
+              </a14:hiddenFill>
+            </a:ext>
+          </a:extLst>
+        </p:spPr>
+      </p:pic>
+      <p:pic>
+        <p:nvPicPr>
+          <p:cNvPr id="1028" name="Picture 4" descr="office database&quot; Icon - Download for free – Iconduck">
+            <a:extLst>
+              <a:ext uri="{FF2B5EF4-FFF2-40B4-BE49-F238E27FC236}">
+                <a16:creationId xmlns:a16="http://schemas.microsoft.com/office/drawing/2014/main" id="{9C2A9784-4822-495F-A01D-EAFE614CEA02}"/>
+              </a:ext>
+            </a:extLst>
+          </p:cNvPr>
+          <p:cNvPicPr>
+            <a:picLocks noChangeAspect="1" noChangeArrowheads="1"/>
+          </p:cNvPicPr>
+          <p:nvPr/>
+        </p:nvPicPr>
+        <p:blipFill>
+          <a:blip r:embed="rId8">
+            <a:extLst>
+              <a:ext uri="{28A0092B-C50C-407E-A947-70E740481C1C}">
+                <a14:useLocalDpi xmlns:a14="http://schemas.microsoft.com/office/drawing/2010/main" val="0"/>
+              </a:ext>
+            </a:extLst>
+          </a:blip>
+          <a:srcRect/>
+          <a:stretch>
+            <a:fillRect/>
+          </a:stretch>
+        </p:blipFill>
+        <p:spPr bwMode="auto">
+          <a:xfrm>
+            <a:off x="5301397" y="3120278"/>
+            <a:ext cx="622618" cy="648592"/>
+          </a:xfrm>
+          <a:prstGeom prst="rect">
+            <a:avLst/>
+          </a:prstGeom>
+          <a:noFill/>
+          <a:extLst>
+            <a:ext uri="{909E8E84-426E-40DD-AFC4-6F175D3DCCD1}">
+              <a14:hiddenFill xmlns:a14="http://schemas.microsoft.com/office/drawing/2010/main">
+                <a:solidFill>
+                  <a:srgbClr val="FFFFFF"/>
+                </a:solidFill>
+              </a14:hiddenFill>
+            </a:ext>
+          </a:extLst>
+        </p:spPr>
+      </p:pic>
+    </p:spTree>
+    <p:extLst>
+      <p:ext uri="{BB962C8B-B14F-4D97-AF65-F5344CB8AC3E}">
+        <p14:creationId xmlns:p14="http://schemas.microsoft.com/office/powerpoint/2010/main" val="2383628859"/>
       </p:ext>
     </p:extLst>
   </p:cSld>
@@ -9891,4 +12270,299 @@
     </a:ext>
   </a:extLst>
 </a:theme>
+</file>
+
+<file path=ppt/theme/theme2.xml><?xml version="1.0" encoding="utf-8"?>
+<a:theme xmlns:a="http://schemas.openxmlformats.org/drawingml/2006/main" name="Office Theme">
+  <a:themeElements>
+    <a:clrScheme name="Office">
+      <a:dk1>
+        <a:sysClr val="windowText" lastClr="000000"/>
+      </a:dk1>
+      <a:lt1>
+        <a:sysClr val="window" lastClr="FFFFFF"/>
+      </a:lt1>
+      <a:dk2>
+        <a:srgbClr val="44546A"/>
+      </a:dk2>
+      <a:lt2>
+        <a:srgbClr val="E7E6E6"/>
+      </a:lt2>
+      <a:accent1>
+        <a:srgbClr val="4472C4"/>
+      </a:accent1>
+      <a:accent2>
+        <a:srgbClr val="ED7D31"/>
+      </a:accent2>
+      <a:accent3>
+        <a:srgbClr val="A5A5A5"/>
+      </a:accent3>
+      <a:accent4>
+        <a:srgbClr val="FFC000"/>
+      </a:accent4>
+      <a:accent5>
+        <a:srgbClr val="5B9BD5"/>
+      </a:accent5>
+      <a:accent6>
+        <a:srgbClr val="70AD47"/>
+      </a:accent6>
+      <a:hlink>
+        <a:srgbClr val="0563C1"/>
+      </a:hlink>
+      <a:folHlink>
+        <a:srgbClr val="954F72"/>
+      </a:folHlink>
+    </a:clrScheme>
+    <a:fontScheme name="Office">
+      <a:majorFont>
+        <a:latin typeface="Calibri Light" panose="020F0302020204030204"/>
+        <a:ea typeface=""/>
+        <a:cs typeface=""/>
+        <a:font script="Jpan" typeface="游ゴシック Light"/>
+        <a:font script="Hang" typeface="맑은 고딕"/>
+        <a:font script="Hans" typeface="等线 Light"/>
+        <a:font script="Hant" typeface="新細明體"/>
+        <a:font script="Arab" typeface="Times New Roman"/>
+        <a:font script="Hebr" typeface="Times New Roman"/>
+        <a:font script="Thai" typeface="Angsana New"/>
+        <a:font script="Ethi" typeface="Nyala"/>
+        <a:font script="Beng" typeface="Vrinda"/>
+        <a:font script="Gujr" typeface="Shruti"/>
+        <a:font script="Khmr" typeface="MoolBoran"/>
+        <a:font script="Knda" typeface="Tunga"/>
+        <a:font script="Guru" typeface="Raavi"/>
+        <a:font script="Cans" typeface="Euphemia"/>
+        <a:font script="Cher" typeface="Plantagenet Cherokee"/>
+        <a:font script="Yiii" typeface="Microsoft Yi Baiti"/>
+        <a:font script="Tibt" typeface="Microsoft Himalaya"/>
+        <a:font script="Thaa" typeface="MV Boli"/>
+        <a:font script="Deva" typeface="Mangal"/>
+        <a:font script="Telu" typeface="Gautami"/>
+        <a:font script="Taml" typeface="Latha"/>
+        <a:font script="Syrc" typeface="Estrangelo Edessa"/>
+        <a:font script="Orya" typeface="Kalinga"/>
+        <a:font script="Mlym" typeface="Kartika"/>
+        <a:font script="Laoo" typeface="DokChampa"/>
+        <a:font script="Sinh" typeface="Iskoola Pota"/>
+        <a:font script="Mong" typeface="Mongolian Baiti"/>
+        <a:font script="Viet" typeface="Times New Roman"/>
+        <a:font script="Uigh" typeface="Microsoft Uighur"/>
+        <a:font script="Geor" typeface="Sylfaen"/>
+        <a:font script="Armn" typeface="Arial"/>
+        <a:font script="Bugi" typeface="Leelawadee UI"/>
+        <a:font script="Bopo" typeface="Microsoft JhengHei"/>
+        <a:font script="Java" typeface="Javanese Text"/>
+        <a:font script="Lisu" typeface="Segoe UI"/>
+        <a:font script="Mymr" typeface="Myanmar Text"/>
+        <a:font script="Nkoo" typeface="Ebrima"/>
+        <a:font script="Olck" typeface="Nirmala UI"/>
+        <a:font script="Osma" typeface="Ebrima"/>
+        <a:font script="Phag" typeface="Phagspa"/>
+        <a:font script="Syrn" typeface="Estrangelo Edessa"/>
+        <a:font script="Syrj" typeface="Estrangelo Edessa"/>
+        <a:font script="Syre" typeface="Estrangelo Edessa"/>
+        <a:font script="Sora" typeface="Nirmala UI"/>
+        <a:font script="Tale" typeface="Microsoft Tai Le"/>
+        <a:font script="Talu" typeface="Microsoft New Tai Lue"/>
+        <a:font script="Tfng" typeface="Ebrima"/>
+      </a:majorFont>
+      <a:minorFont>
+        <a:latin typeface="Calibri" panose="020F0502020204030204"/>
+        <a:ea typeface=""/>
+        <a:cs typeface=""/>
+        <a:font script="Jpan" typeface="游ゴシック"/>
+        <a:font script="Hang" typeface="맑은 고딕"/>
+        <a:font script="Hans" typeface="等线"/>
+        <a:font script="Hant" typeface="新細明體"/>
+        <a:font script="Arab" typeface="Arial"/>
+        <a:font script="Hebr" typeface="Arial"/>
+        <a:font script="Thai" typeface="Cordia New"/>
+        <a:font script="Ethi" typeface="Nyala"/>
+        <a:font script="Beng" typeface="Vrinda"/>
+        <a:font script="Gujr" typeface="Shruti"/>
+        <a:font script="Khmr" typeface="DaunPenh"/>
+        <a:font script="Knda" typeface="Tunga"/>
+        <a:font script="Guru" typeface="Raavi"/>
+        <a:font script="Cans" typeface="Euphemia"/>
+        <a:font script="Cher" typeface="Plantagenet Cherokee"/>
+        <a:font script="Yiii" typeface="Microsoft Yi Baiti"/>
+        <a:font script="Tibt" typeface="Microsoft Himalaya"/>
+        <a:font script="Thaa" typeface="MV Boli"/>
+        <a:font script="Deva" typeface="Mangal"/>
+        <a:font script="Telu" typeface="Gautami"/>
+        <a:font script="Taml" typeface="Latha"/>
+        <a:font script="Syrc" typeface="Estrangelo Edessa"/>
+        <a:font script="Orya" typeface="Kalinga"/>
+        <a:font script="Mlym" typeface="Kartika"/>
+        <a:font script="Laoo" typeface="DokChampa"/>
+        <a:font script="Sinh" typeface="Iskoola Pota"/>
+        <a:font script="Mong" typeface="Mongolian Baiti"/>
+        <a:font script="Viet" typeface="Arial"/>
+        <a:font script="Uigh" typeface="Microsoft Uighur"/>
+        <a:font script="Geor" typeface="Sylfaen"/>
+        <a:font script="Armn" typeface="Arial"/>
+        <a:font script="Bugi" typeface="Leelawadee UI"/>
+        <a:font script="Bopo" typeface="Microsoft JhengHei"/>
+        <a:font script="Java" typeface="Javanese Text"/>
+        <a:font script="Lisu" typeface="Segoe UI"/>
+        <a:font script="Mymr" typeface="Myanmar Text"/>
+        <a:font script="Nkoo" typeface="Ebrima"/>
+        <a:font script="Olck" typeface="Nirmala UI"/>
+        <a:font script="Osma" typeface="Ebrima"/>
+        <a:font script="Phag" typeface="Phagspa"/>
+        <a:font script="Syrn" typeface="Estrangelo Edessa"/>
+        <a:font script="Syrj" typeface="Estrangelo Edessa"/>
+        <a:font script="Syre" typeface="Estrangelo Edessa"/>
+        <a:font script="Sora" typeface="Nirmala UI"/>
+        <a:font script="Tale" typeface="Microsoft Tai Le"/>
+        <a:font script="Talu" typeface="Microsoft New Tai Lue"/>
+        <a:font script="Tfng" typeface="Ebrima"/>
+      </a:minorFont>
+    </a:fontScheme>
+    <a:fmtScheme name="Office">
+      <a:fillStyleLst>
+        <a:solidFill>
+          <a:schemeClr val="phClr"/>
+        </a:solidFill>
+        <a:gradFill rotWithShape="1">
+          <a:gsLst>
+            <a:gs pos="0">
+              <a:schemeClr val="phClr">
+                <a:lumMod val="110000"/>
+                <a:satMod val="105000"/>
+                <a:tint val="67000"/>
+              </a:schemeClr>
+            </a:gs>
+            <a:gs pos="50000">
+              <a:schemeClr val="phClr">
+                <a:lumMod val="105000"/>
+                <a:satMod val="103000"/>
+                <a:tint val="73000"/>
+              </a:schemeClr>
+            </a:gs>
+            <a:gs pos="100000">
+              <a:schemeClr val="phClr">
+                <a:lumMod val="105000"/>
+                <a:satMod val="109000"/>
+                <a:tint val="81000"/>
+              </a:schemeClr>
+            </a:gs>
+          </a:gsLst>
+          <a:lin ang="5400000" scaled="0"/>
+        </a:gradFill>
+        <a:gradFill rotWithShape="1">
+          <a:gsLst>
+            <a:gs pos="0">
+              <a:schemeClr val="phClr">
+                <a:satMod val="103000"/>
+                <a:lumMod val="102000"/>
+                <a:tint val="94000"/>
+              </a:schemeClr>
+            </a:gs>
+            <a:gs pos="50000">
+              <a:schemeClr val="phClr">
+                <a:satMod val="110000"/>
+                <a:lumMod val="100000"/>
+                <a:shade val="100000"/>
+              </a:schemeClr>
+            </a:gs>
+            <a:gs pos="100000">
+              <a:schemeClr val="phClr">
+                <a:lumMod val="99000"/>
+                <a:satMod val="120000"/>
+                <a:shade val="78000"/>
+              </a:schemeClr>
+            </a:gs>
+          </a:gsLst>
+          <a:lin ang="5400000" scaled="0"/>
+        </a:gradFill>
+      </a:fillStyleLst>
+      <a:lnStyleLst>
+        <a:ln w="6350" cap="flat" cmpd="sng" algn="ctr">
+          <a:solidFill>
+            <a:schemeClr val="phClr"/>
+          </a:solidFill>
+          <a:prstDash val="solid"/>
+          <a:miter lim="800000"/>
+        </a:ln>
+        <a:ln w="12700" cap="flat" cmpd="sng" algn="ctr">
+          <a:solidFill>
+            <a:schemeClr val="phClr"/>
+          </a:solidFill>
+          <a:prstDash val="solid"/>
+          <a:miter lim="800000"/>
+        </a:ln>
+        <a:ln w="19050" cap="flat" cmpd="sng" algn="ctr">
+          <a:solidFill>
+            <a:schemeClr val="phClr"/>
+          </a:solidFill>
+          <a:prstDash val="solid"/>
+          <a:miter lim="800000"/>
+        </a:ln>
+      </a:lnStyleLst>
+      <a:effectStyleLst>
+        <a:effectStyle>
+          <a:effectLst/>
+        </a:effectStyle>
+        <a:effectStyle>
+          <a:effectLst/>
+        </a:effectStyle>
+        <a:effectStyle>
+          <a:effectLst>
+            <a:outerShdw blurRad="57150" dist="19050" dir="5400000" algn="ctr" rotWithShape="0">
+              <a:srgbClr val="000000">
+                <a:alpha val="63000"/>
+              </a:srgbClr>
+            </a:outerShdw>
+          </a:effectLst>
+        </a:effectStyle>
+      </a:effectStyleLst>
+      <a:bgFillStyleLst>
+        <a:solidFill>
+          <a:schemeClr val="phClr"/>
+        </a:solidFill>
+        <a:solidFill>
+          <a:schemeClr val="phClr">
+            <a:tint val="95000"/>
+            <a:satMod val="170000"/>
+          </a:schemeClr>
+        </a:solidFill>
+        <a:gradFill rotWithShape="1">
+          <a:gsLst>
+            <a:gs pos="0">
+              <a:schemeClr val="phClr">
+                <a:tint val="93000"/>
+                <a:satMod val="150000"/>
+                <a:shade val="98000"/>
+                <a:lumMod val="102000"/>
+              </a:schemeClr>
+            </a:gs>
+            <a:gs pos="50000">
+              <a:schemeClr val="phClr">
+                <a:tint val="98000"/>
+                <a:satMod val="130000"/>
+                <a:shade val="90000"/>
+                <a:lumMod val="103000"/>
+              </a:schemeClr>
+            </a:gs>
+            <a:gs pos="100000">
+              <a:schemeClr val="phClr">
+                <a:shade val="63000"/>
+                <a:satMod val="120000"/>
+              </a:schemeClr>
+            </a:gs>
+          </a:gsLst>
+          <a:lin ang="5400000" scaled="0"/>
+        </a:gradFill>
+      </a:bgFillStyleLst>
+    </a:fmtScheme>
+  </a:themeElements>
+  <a:objectDefaults/>
+  <a:extraClrSchemeLst/>
+  <a:extLst>
+    <a:ext uri="{05A4C25C-085E-4340-85A3-A5531E510DB2}">
+      <thm15:themeFamily xmlns:thm15="http://schemas.microsoft.com/office/thememl/2012/main" name="Office Theme" id="{62F939B6-93AF-4DB8-9C6B-D6C7DFDC589F}" vid="{4A3C46E8-61CC-4603-A589-7422A47A8E4A}"/>
+    </a:ext>
+  </a:extLst>
+</a:theme>
 </file>
</xml_diff>

<commit_message>
Running Ad-hoc H2O Analysis
</commit_message>
<xml_diff>
--- a/Report/Pipeline_Process.pptx
+++ b/Report/Pipeline_Process.pptx
@@ -5,7 +5,7 @@
     <p:sldMasterId id="2147483648" r:id="rId1"/>
   </p:sldMasterIdLst>
   <p:notesMasterIdLst>
-    <p:notesMasterId r:id="rId10"/>
+    <p:notesMasterId r:id="rId14"/>
   </p:notesMasterIdLst>
   <p:sldIdLst>
     <p:sldId id="356" r:id="rId2"/>
@@ -16,6 +16,10 @@
     <p:sldId id="353" r:id="rId7"/>
     <p:sldId id="352" r:id="rId8"/>
     <p:sldId id="357" r:id="rId9"/>
+    <p:sldId id="359" r:id="rId10"/>
+    <p:sldId id="360" r:id="rId11"/>
+    <p:sldId id="361" r:id="rId12"/>
+    <p:sldId id="362" r:id="rId13"/>
   </p:sldIdLst>
   <p:sldSz cx="12192000" cy="6858000"/>
   <p:notesSz cx="6858000" cy="9144000"/>
@@ -16133,6 +16137,552 @@
     <p:extLst>
       <p:ext uri="{BB962C8B-B14F-4D97-AF65-F5344CB8AC3E}">
         <p14:creationId xmlns:p14="http://schemas.microsoft.com/office/powerpoint/2010/main" val="3004191264"/>
+      </p:ext>
+    </p:extLst>
+  </p:cSld>
+  <p:clrMapOvr>
+    <a:masterClrMapping/>
+  </p:clrMapOvr>
+</p:sld>
+</file>
+
+<file path=ppt/slides/slide10.xml><?xml version="1.0" encoding="utf-8"?>
+<p:sld xmlns:a="http://schemas.openxmlformats.org/drawingml/2006/main" xmlns:r="http://schemas.openxmlformats.org/officeDocument/2006/relationships" xmlns:p="http://schemas.openxmlformats.org/presentationml/2006/main">
+  <p:cSld>
+    <p:spTree>
+      <p:nvGrpSpPr>
+        <p:cNvPr id="1" name=""/>
+        <p:cNvGrpSpPr/>
+        <p:nvPr/>
+      </p:nvGrpSpPr>
+      <p:grpSpPr>
+        <a:xfrm>
+          <a:off x="0" y="0"/>
+          <a:ext cx="0" cy="0"/>
+          <a:chOff x="0" y="0"/>
+          <a:chExt cx="0" cy="0"/>
+        </a:xfrm>
+      </p:grpSpPr>
+      <p:sp>
+        <p:nvSpPr>
+          <p:cNvPr id="3" name="Rectangle 2">
+            <a:extLst>
+              <a:ext uri="{FF2B5EF4-FFF2-40B4-BE49-F238E27FC236}">
+                <a16:creationId xmlns:a16="http://schemas.microsoft.com/office/drawing/2014/main" id="{F14B05A7-BB9F-BE8B-2644-529ADA28BF37}"/>
+              </a:ext>
+            </a:extLst>
+          </p:cNvPr>
+          <p:cNvSpPr/>
+          <p:nvPr/>
+        </p:nvSpPr>
+        <p:spPr>
+          <a:xfrm>
+            <a:off x="146756" y="0"/>
+            <a:ext cx="12045244" cy="892552"/>
+          </a:xfrm>
+          <a:prstGeom prst="rect">
+            <a:avLst/>
+          </a:prstGeom>
+        </p:spPr>
+        <p:txBody>
+          <a:bodyPr wrap="square">
+            <a:spAutoFit/>
+          </a:bodyPr>
+          <a:lstStyle/>
+          <a:p>
+            <a:r>
+              <a:rPr lang="en-IN" sz="3200" dirty="0">
+                <a:latin typeface="Agency FB" panose="020B0503020202020204" pitchFamily="34" charset="0"/>
+              </a:rPr>
+              <a:t>Air and Traffic : </a:t>
+            </a:r>
+            <a:r>
+              <a:rPr lang="en-IN" sz="5200" dirty="0">
+                <a:solidFill>
+                  <a:schemeClr val="accent6">
+                    <a:lumMod val="75000"/>
+                  </a:schemeClr>
+                </a:solidFill>
+                <a:latin typeface="Agency FB" panose="020B0503020202020204" pitchFamily="34" charset="0"/>
+              </a:rPr>
+              <a:t>H</a:t>
+            </a:r>
+            <a:r>
+              <a:rPr lang="en-IN" sz="5200" baseline="-25000" dirty="0">
+                <a:solidFill>
+                  <a:schemeClr val="accent6">
+                    <a:lumMod val="75000"/>
+                  </a:schemeClr>
+                </a:solidFill>
+                <a:latin typeface="Agency FB" panose="020B0503020202020204" pitchFamily="34" charset="0"/>
+              </a:rPr>
+              <a:t>2</a:t>
+            </a:r>
+            <a:r>
+              <a:rPr lang="en-IN" sz="5200" dirty="0">
+                <a:solidFill>
+                  <a:schemeClr val="accent6">
+                    <a:lumMod val="75000"/>
+                  </a:schemeClr>
+                </a:solidFill>
+                <a:latin typeface="Agency FB" panose="020B0503020202020204" pitchFamily="34" charset="0"/>
+              </a:rPr>
+              <a:t>O </a:t>
+            </a:r>
+            <a:r>
+              <a:rPr lang="en-IN" sz="5200" b="1" dirty="0" err="1">
+                <a:solidFill>
+                  <a:schemeClr val="accent6">
+                    <a:lumMod val="75000"/>
+                  </a:schemeClr>
+                </a:solidFill>
+                <a:latin typeface="Agency FB" panose="020B0503020202020204" pitchFamily="34" charset="0"/>
+              </a:rPr>
+              <a:t>Pedestrains</a:t>
+            </a:r>
+            <a:r>
+              <a:rPr lang="en-IN" sz="5200" dirty="0">
+                <a:solidFill>
+                  <a:schemeClr val="accent6">
+                    <a:lumMod val="75000"/>
+                  </a:schemeClr>
+                </a:solidFill>
+                <a:latin typeface="Agency FB" panose="020B0503020202020204" pitchFamily="34" charset="0"/>
+              </a:rPr>
+              <a:t> More </a:t>
+            </a:r>
+            <a:r>
+              <a:rPr lang="en-IN" sz="5200" b="1" dirty="0">
+                <a:solidFill>
+                  <a:schemeClr val="accent6">
+                    <a:lumMod val="75000"/>
+                  </a:schemeClr>
+                </a:solidFill>
+                <a:latin typeface="Agency FB" panose="020B0503020202020204" pitchFamily="34" charset="0"/>
+              </a:rPr>
+              <a:t>Spatial</a:t>
+            </a:r>
+            <a:r>
+              <a:rPr lang="en-IN" sz="5200" dirty="0">
+                <a:solidFill>
+                  <a:schemeClr val="accent6">
+                    <a:lumMod val="75000"/>
+                  </a:schemeClr>
+                </a:solidFill>
+                <a:latin typeface="Agency FB" panose="020B0503020202020204" pitchFamily="34" charset="0"/>
+              </a:rPr>
+              <a:t> Less </a:t>
+            </a:r>
+            <a:r>
+              <a:rPr lang="en-IN" sz="5200" b="1" dirty="0">
+                <a:solidFill>
+                  <a:srgbClr val="002060"/>
+                </a:solidFill>
+                <a:latin typeface="Agency FB" panose="020B0503020202020204" pitchFamily="34" charset="0"/>
+              </a:rPr>
+              <a:t>Temporal</a:t>
+            </a:r>
+          </a:p>
+        </p:txBody>
+      </p:sp>
+      <p:pic>
+        <p:nvPicPr>
+          <p:cNvPr id="2" name="Picture 1">
+            <a:extLst>
+              <a:ext uri="{FF2B5EF4-FFF2-40B4-BE49-F238E27FC236}">
+                <a16:creationId xmlns:a16="http://schemas.microsoft.com/office/drawing/2014/main" id="{CA2149F2-72B0-923C-8226-F25BA654D492}"/>
+              </a:ext>
+            </a:extLst>
+          </p:cNvPr>
+          <p:cNvPicPr>
+            <a:picLocks noChangeAspect="1"/>
+          </p:cNvPicPr>
+          <p:nvPr/>
+        </p:nvPicPr>
+        <p:blipFill>
+          <a:blip r:embed="rId2"/>
+          <a:stretch>
+            <a:fillRect/>
+          </a:stretch>
+        </p:blipFill>
+        <p:spPr>
+          <a:xfrm>
+            <a:off x="146756" y="892553"/>
+            <a:ext cx="12045243" cy="5926444"/>
+          </a:xfrm>
+          <a:prstGeom prst="rect">
+            <a:avLst/>
+          </a:prstGeom>
+        </p:spPr>
+      </p:pic>
+    </p:spTree>
+    <p:extLst>
+      <p:ext uri="{BB962C8B-B14F-4D97-AF65-F5344CB8AC3E}">
+        <p14:creationId xmlns:p14="http://schemas.microsoft.com/office/powerpoint/2010/main" val="1942887179"/>
+      </p:ext>
+    </p:extLst>
+  </p:cSld>
+  <p:clrMapOvr>
+    <a:masterClrMapping/>
+  </p:clrMapOvr>
+</p:sld>
+</file>
+
+<file path=ppt/slides/slide11.xml><?xml version="1.0" encoding="utf-8"?>
+<p:sld xmlns:a="http://schemas.openxmlformats.org/drawingml/2006/main" xmlns:r="http://schemas.openxmlformats.org/officeDocument/2006/relationships" xmlns:p="http://schemas.openxmlformats.org/presentationml/2006/main">
+  <p:cSld>
+    <p:spTree>
+      <p:nvGrpSpPr>
+        <p:cNvPr id="1" name=""/>
+        <p:cNvGrpSpPr/>
+        <p:nvPr/>
+      </p:nvGrpSpPr>
+      <p:grpSpPr>
+        <a:xfrm>
+          <a:off x="0" y="0"/>
+          <a:ext cx="0" cy="0"/>
+          <a:chOff x="0" y="0"/>
+          <a:chExt cx="0" cy="0"/>
+        </a:xfrm>
+      </p:grpSpPr>
+      <p:sp>
+        <p:nvSpPr>
+          <p:cNvPr id="3" name="Rectangle 2">
+            <a:extLst>
+              <a:ext uri="{FF2B5EF4-FFF2-40B4-BE49-F238E27FC236}">
+                <a16:creationId xmlns:a16="http://schemas.microsoft.com/office/drawing/2014/main" id="{F14B05A7-BB9F-BE8B-2644-529ADA28BF37}"/>
+              </a:ext>
+            </a:extLst>
+          </p:cNvPr>
+          <p:cNvSpPr/>
+          <p:nvPr/>
+        </p:nvSpPr>
+        <p:spPr>
+          <a:xfrm>
+            <a:off x="146756" y="0"/>
+            <a:ext cx="11898488" cy="892552"/>
+          </a:xfrm>
+          <a:prstGeom prst="rect">
+            <a:avLst/>
+          </a:prstGeom>
+        </p:spPr>
+        <p:txBody>
+          <a:bodyPr wrap="square">
+            <a:spAutoFit/>
+          </a:bodyPr>
+          <a:lstStyle/>
+          <a:p>
+            <a:pPr algn="ctr"/>
+            <a:r>
+              <a:rPr lang="en-IN" sz="3200" b="1" dirty="0">
+                <a:latin typeface="Agency FB" panose="020B0503020202020204" pitchFamily="34" charset="0"/>
+              </a:rPr>
+              <a:t>Where</a:t>
+            </a:r>
+            <a:r>
+              <a:rPr lang="en-IN" sz="3200" dirty="0">
+                <a:latin typeface="Agency FB" panose="020B0503020202020204" pitchFamily="34" charset="0"/>
+              </a:rPr>
+              <a:t> </a:t>
+            </a:r>
+            <a:r>
+              <a:rPr lang="en-IN" sz="3200" b="1" dirty="0">
+                <a:latin typeface="Agency FB" panose="020B0503020202020204" pitchFamily="34" charset="0"/>
+              </a:rPr>
+              <a:t>is</a:t>
+            </a:r>
+            <a:r>
+              <a:rPr lang="en-IN" sz="3200" dirty="0">
+                <a:latin typeface="Agency FB" panose="020B0503020202020204" pitchFamily="34" charset="0"/>
+              </a:rPr>
+              <a:t>: </a:t>
+            </a:r>
+            <a:r>
+              <a:rPr lang="en-IN" sz="5200" dirty="0">
+                <a:solidFill>
+                  <a:schemeClr val="accent6">
+                    <a:lumMod val="75000"/>
+                  </a:schemeClr>
+                </a:solidFill>
+                <a:latin typeface="Agency FB" panose="020B0503020202020204" pitchFamily="34" charset="0"/>
+              </a:rPr>
+              <a:t>H</a:t>
+            </a:r>
+            <a:r>
+              <a:rPr lang="en-IN" sz="5200" baseline="-25000" dirty="0">
+                <a:solidFill>
+                  <a:schemeClr val="accent6">
+                    <a:lumMod val="75000"/>
+                  </a:schemeClr>
+                </a:solidFill>
+                <a:latin typeface="Agency FB" panose="020B0503020202020204" pitchFamily="34" charset="0"/>
+              </a:rPr>
+              <a:t>2</a:t>
+            </a:r>
+            <a:r>
+              <a:rPr lang="en-IN" sz="5200" dirty="0">
+                <a:solidFill>
+                  <a:schemeClr val="accent6">
+                    <a:lumMod val="75000"/>
+                  </a:schemeClr>
+                </a:solidFill>
+                <a:latin typeface="Agency FB" panose="020B0503020202020204" pitchFamily="34" charset="0"/>
+              </a:rPr>
+              <a:t>O </a:t>
+            </a:r>
+            <a:r>
+              <a:rPr lang="en-IN" sz="5200" b="1" dirty="0" err="1">
+                <a:solidFill>
+                  <a:schemeClr val="accent6">
+                    <a:lumMod val="75000"/>
+                  </a:schemeClr>
+                </a:solidFill>
+                <a:latin typeface="Agency FB" panose="020B0503020202020204" pitchFamily="34" charset="0"/>
+              </a:rPr>
+              <a:t>Pedestrains</a:t>
+            </a:r>
+            <a:r>
+              <a:rPr lang="en-IN" sz="5200" dirty="0">
+                <a:solidFill>
+                  <a:schemeClr val="accent6">
+                    <a:lumMod val="75000"/>
+                  </a:schemeClr>
+                </a:solidFill>
+                <a:latin typeface="Agency FB" panose="020B0503020202020204" pitchFamily="34" charset="0"/>
+              </a:rPr>
+              <a:t> More </a:t>
+            </a:r>
+            <a:r>
+              <a:rPr lang="en-IN" sz="5200" b="1" dirty="0">
+                <a:solidFill>
+                  <a:schemeClr val="accent6">
+                    <a:lumMod val="75000"/>
+                  </a:schemeClr>
+                </a:solidFill>
+                <a:latin typeface="Agency FB" panose="020B0503020202020204" pitchFamily="34" charset="0"/>
+              </a:rPr>
+              <a:t>Spatial</a:t>
+            </a:r>
+            <a:r>
+              <a:rPr lang="en-IN" sz="5200" dirty="0">
+                <a:solidFill>
+                  <a:schemeClr val="accent6">
+                    <a:lumMod val="75000"/>
+                  </a:schemeClr>
+                </a:solidFill>
+                <a:latin typeface="Agency FB" panose="020B0503020202020204" pitchFamily="34" charset="0"/>
+              </a:rPr>
+              <a:t> Less </a:t>
+            </a:r>
+            <a:r>
+              <a:rPr lang="en-IN" sz="5200" b="1" dirty="0">
+                <a:solidFill>
+                  <a:srgbClr val="002060"/>
+                </a:solidFill>
+                <a:latin typeface="Agency FB" panose="020B0503020202020204" pitchFamily="34" charset="0"/>
+              </a:rPr>
+              <a:t>Temporal</a:t>
+            </a:r>
+          </a:p>
+        </p:txBody>
+      </p:sp>
+      <p:pic>
+        <p:nvPicPr>
+          <p:cNvPr id="2" name="Picture 1">
+            <a:extLst>
+              <a:ext uri="{FF2B5EF4-FFF2-40B4-BE49-F238E27FC236}">
+                <a16:creationId xmlns:a16="http://schemas.microsoft.com/office/drawing/2014/main" id="{18BA2162-5A46-1B88-B71B-D56312F39C47}"/>
+              </a:ext>
+            </a:extLst>
+          </p:cNvPr>
+          <p:cNvPicPr>
+            <a:picLocks noChangeAspect="1"/>
+          </p:cNvPicPr>
+          <p:nvPr/>
+        </p:nvPicPr>
+        <p:blipFill>
+          <a:blip r:embed="rId2"/>
+          <a:stretch>
+            <a:fillRect/>
+          </a:stretch>
+        </p:blipFill>
+        <p:spPr>
+          <a:xfrm>
+            <a:off x="1" y="892552"/>
+            <a:ext cx="12045244" cy="5954531"/>
+          </a:xfrm>
+          <a:prstGeom prst="rect">
+            <a:avLst/>
+          </a:prstGeom>
+        </p:spPr>
+      </p:pic>
+    </p:spTree>
+    <p:extLst>
+      <p:ext uri="{BB962C8B-B14F-4D97-AF65-F5344CB8AC3E}">
+        <p14:creationId xmlns:p14="http://schemas.microsoft.com/office/powerpoint/2010/main" val="913306657"/>
+      </p:ext>
+    </p:extLst>
+  </p:cSld>
+  <p:clrMapOvr>
+    <a:masterClrMapping/>
+  </p:clrMapOvr>
+</p:sld>
+</file>
+
+<file path=ppt/slides/slide12.xml><?xml version="1.0" encoding="utf-8"?>
+<p:sld xmlns:a="http://schemas.openxmlformats.org/drawingml/2006/main" xmlns:r="http://schemas.openxmlformats.org/officeDocument/2006/relationships" xmlns:p="http://schemas.openxmlformats.org/presentationml/2006/main">
+  <p:cSld>
+    <p:spTree>
+      <p:nvGrpSpPr>
+        <p:cNvPr id="1" name=""/>
+        <p:cNvGrpSpPr/>
+        <p:nvPr/>
+      </p:nvGrpSpPr>
+      <p:grpSpPr>
+        <a:xfrm>
+          <a:off x="0" y="0"/>
+          <a:ext cx="0" cy="0"/>
+          <a:chOff x="0" y="0"/>
+          <a:chExt cx="0" cy="0"/>
+        </a:xfrm>
+      </p:grpSpPr>
+      <p:sp>
+        <p:nvSpPr>
+          <p:cNvPr id="3" name="Rectangle 2">
+            <a:extLst>
+              <a:ext uri="{FF2B5EF4-FFF2-40B4-BE49-F238E27FC236}">
+                <a16:creationId xmlns:a16="http://schemas.microsoft.com/office/drawing/2014/main" id="{F14B05A7-BB9F-BE8B-2644-529ADA28BF37}"/>
+              </a:ext>
+            </a:extLst>
+          </p:cNvPr>
+          <p:cNvSpPr/>
+          <p:nvPr/>
+        </p:nvSpPr>
+        <p:spPr>
+          <a:xfrm>
+            <a:off x="146756" y="0"/>
+            <a:ext cx="11898488" cy="892552"/>
+          </a:xfrm>
+          <a:prstGeom prst="rect">
+            <a:avLst/>
+          </a:prstGeom>
+        </p:spPr>
+        <p:txBody>
+          <a:bodyPr wrap="square">
+            <a:spAutoFit/>
+          </a:bodyPr>
+          <a:lstStyle/>
+          <a:p>
+            <a:pPr algn="ctr"/>
+            <a:r>
+              <a:rPr lang="en-IN" sz="3200" dirty="0">
+                <a:latin typeface="Agency FB" panose="020B0503020202020204" pitchFamily="34" charset="0"/>
+              </a:rPr>
+              <a:t>Finally: </a:t>
+            </a:r>
+            <a:r>
+              <a:rPr lang="en-IN" sz="5200" dirty="0">
+                <a:solidFill>
+                  <a:schemeClr val="accent6">
+                    <a:lumMod val="75000"/>
+                  </a:schemeClr>
+                </a:solidFill>
+                <a:latin typeface="Agency FB" panose="020B0503020202020204" pitchFamily="34" charset="0"/>
+              </a:rPr>
+              <a:t>The Map</a:t>
+            </a:r>
+            <a:endParaRPr lang="en-IN" sz="5200" b="1" dirty="0">
+              <a:solidFill>
+                <a:srgbClr val="002060"/>
+              </a:solidFill>
+              <a:latin typeface="Agency FB" panose="020B0503020202020204" pitchFamily="34" charset="0"/>
+            </a:endParaRPr>
+          </a:p>
+        </p:txBody>
+      </p:sp>
+      <p:sp>
+        <p:nvSpPr>
+          <p:cNvPr id="4" name="TextBox 3">
+            <a:extLst>
+              <a:ext uri="{FF2B5EF4-FFF2-40B4-BE49-F238E27FC236}">
+                <a16:creationId xmlns:a16="http://schemas.microsoft.com/office/drawing/2014/main" id="{49D73F53-F861-B98B-1888-320AEC4CB6F2}"/>
+              </a:ext>
+            </a:extLst>
+          </p:cNvPr>
+          <p:cNvSpPr txBox="1"/>
+          <p:nvPr/>
+        </p:nvSpPr>
+        <p:spPr>
+          <a:xfrm>
+            <a:off x="439387" y="1471613"/>
+            <a:ext cx="11519065" cy="1938992"/>
+          </a:xfrm>
+          <a:prstGeom prst="rect">
+            <a:avLst/>
+          </a:prstGeom>
+          <a:noFill/>
+        </p:spPr>
+        <p:txBody>
+          <a:bodyPr wrap="square" rtlCol="0">
+            <a:spAutoFit/>
+          </a:bodyPr>
+          <a:lstStyle/>
+          <a:p>
+            <a:r>
+              <a:rPr lang="en-US" sz="6000" dirty="0">
+                <a:hlinkClick r:id="rId2"/>
+              </a:rPr>
+              <a:t>https://amr-y-shalaby.github.io/ggr_472_project/</a:t>
+            </a:r>
+            <a:endParaRPr lang="en-US" sz="6000" dirty="0"/>
+          </a:p>
+        </p:txBody>
+      </p:sp>
+      <p:sp>
+        <p:nvSpPr>
+          <p:cNvPr id="5" name="TextBox 4">
+            <a:extLst>
+              <a:ext uri="{FF2B5EF4-FFF2-40B4-BE49-F238E27FC236}">
+                <a16:creationId xmlns:a16="http://schemas.microsoft.com/office/drawing/2014/main" id="{C880C50A-CD9E-FC1A-9CD8-8C933053C124}"/>
+              </a:ext>
+            </a:extLst>
+          </p:cNvPr>
+          <p:cNvSpPr txBox="1"/>
+          <p:nvPr/>
+        </p:nvSpPr>
+        <p:spPr>
+          <a:xfrm>
+            <a:off x="439387" y="4141582"/>
+            <a:ext cx="11519065" cy="1938992"/>
+          </a:xfrm>
+          <a:prstGeom prst="rect">
+            <a:avLst/>
+          </a:prstGeom>
+          <a:noFill/>
+        </p:spPr>
+        <p:txBody>
+          <a:bodyPr wrap="square" rtlCol="0">
+            <a:spAutoFit/>
+          </a:bodyPr>
+          <a:lstStyle/>
+          <a:p>
+            <a:r>
+              <a:rPr lang="en-US" sz="6000" dirty="0">
+                <a:hlinkClick r:id="rId3"/>
+              </a:rPr>
+              <a:t>https://github.com/amr-y-shalaby/ggr_472_project</a:t>
+            </a:r>
+            <a:r>
+              <a:rPr lang="en-US" sz="6000" dirty="0"/>
+              <a:t> </a:t>
+            </a:r>
+          </a:p>
+        </p:txBody>
+      </p:sp>
+    </p:spTree>
+    <p:extLst>
+      <p:ext uri="{BB962C8B-B14F-4D97-AF65-F5344CB8AC3E}">
+        <p14:creationId xmlns:p14="http://schemas.microsoft.com/office/powerpoint/2010/main" val="2276401753"/>
       </p:ext>
     </p:extLst>
   </p:cSld>
@@ -26275,8 +26825,8 @@
           </a:extLst>
         </p:spPr>
       </p:pic>
-      <mc:AlternateContent xmlns:mc="http://schemas.openxmlformats.org/markup-compatibility/2006">
-        <mc:Choice xmlns:a14="http://schemas.microsoft.com/office/drawing/2010/main" Requires="a14">
+      <mc:AlternateContent xmlns:mc="http://schemas.openxmlformats.org/markup-compatibility/2006" xmlns:a14="http://schemas.microsoft.com/office/drawing/2010/main">
+        <mc:Choice Requires="a14">
           <p:sp>
             <p:nvSpPr>
               <p:cNvPr id="8" name="Rectangle 7">
@@ -26448,7 +26998,7 @@
             </p:txBody>
           </p:sp>
         </mc:Choice>
-        <mc:Fallback>
+        <mc:Fallback xmlns="">
           <p:sp>
             <p:nvSpPr>
               <p:cNvPr id="8" name="Rectangle 7">
@@ -27654,7 +28204,7 @@
         <p:spPr>
           <a:xfrm>
             <a:off x="146756" y="0"/>
-            <a:ext cx="11898488" cy="923330"/>
+            <a:ext cx="11898488" cy="892552"/>
           </a:xfrm>
           <a:prstGeom prst="rect">
             <a:avLst/>
@@ -27671,7 +28221,7 @@
               <a:rPr lang="en-IN" sz="3200" dirty="0">
                 <a:latin typeface="Agency FB" panose="020B0503020202020204" pitchFamily="34" charset="0"/>
               </a:rPr>
-              <a:t>Air and Traffic Data ETL Design </a:t>
+              <a:t>Air and Traffic: </a:t>
             </a:r>
             <a:r>
               <a:rPr lang="en-IN" sz="5200" dirty="0">
@@ -27704,15 +28254,277 @@
                 </a:solidFill>
                 <a:latin typeface="Agency FB" panose="020B0503020202020204" pitchFamily="34" charset="0"/>
               </a:rPr>
-              <a:t>O Statistical Truths</a:t>
+              <a:t>O Traffic More </a:t>
+            </a:r>
+            <a:r>
+              <a:rPr lang="en-IN" sz="5200" b="1" dirty="0">
+                <a:solidFill>
+                  <a:schemeClr val="accent6">
+                    <a:lumMod val="75000"/>
+                  </a:schemeClr>
+                </a:solidFill>
+                <a:latin typeface="Agency FB" panose="020B0503020202020204" pitchFamily="34" charset="0"/>
+              </a:rPr>
+              <a:t>Spatial</a:t>
+            </a:r>
+            <a:r>
+              <a:rPr lang="en-IN" sz="5200" dirty="0">
+                <a:solidFill>
+                  <a:schemeClr val="accent6">
+                    <a:lumMod val="75000"/>
+                  </a:schemeClr>
+                </a:solidFill>
+                <a:latin typeface="Agency FB" panose="020B0503020202020204" pitchFamily="34" charset="0"/>
+              </a:rPr>
+              <a:t> Less </a:t>
+            </a:r>
+            <a:r>
+              <a:rPr lang="en-IN" sz="5200" b="1" dirty="0">
+                <a:solidFill>
+                  <a:srgbClr val="002060"/>
+                </a:solidFill>
+                <a:latin typeface="Agency FB" panose="020B0503020202020204" pitchFamily="34" charset="0"/>
+              </a:rPr>
+              <a:t>Temporal</a:t>
             </a:r>
           </a:p>
         </p:txBody>
       </p:sp>
+      <p:pic>
+        <p:nvPicPr>
+          <p:cNvPr id="2" name="Picture 1">
+            <a:extLst>
+              <a:ext uri="{FF2B5EF4-FFF2-40B4-BE49-F238E27FC236}">
+                <a16:creationId xmlns:a16="http://schemas.microsoft.com/office/drawing/2014/main" id="{C1A4FCDF-1FBF-5076-899A-A38E98FE50CA}"/>
+              </a:ext>
+            </a:extLst>
+          </p:cNvPr>
+          <p:cNvPicPr>
+            <a:picLocks noChangeAspect="1"/>
+          </p:cNvPicPr>
+          <p:nvPr/>
+        </p:nvPicPr>
+        <p:blipFill>
+          <a:blip r:embed="rId2"/>
+          <a:stretch>
+            <a:fillRect/>
+          </a:stretch>
+        </p:blipFill>
+        <p:spPr>
+          <a:xfrm>
+            <a:off x="146756" y="721450"/>
+            <a:ext cx="12045244" cy="5824158"/>
+          </a:xfrm>
+          <a:prstGeom prst="rect">
+            <a:avLst/>
+          </a:prstGeom>
+        </p:spPr>
+      </p:pic>
     </p:spTree>
     <p:extLst>
       <p:ext uri="{BB962C8B-B14F-4D97-AF65-F5344CB8AC3E}">
         <p14:creationId xmlns:p14="http://schemas.microsoft.com/office/powerpoint/2010/main" val="1673821164"/>
+      </p:ext>
+    </p:extLst>
+  </p:cSld>
+  <p:clrMapOvr>
+    <a:masterClrMapping/>
+  </p:clrMapOvr>
+</p:sld>
+</file>
+
+<file path=ppt/slides/slide9.xml><?xml version="1.0" encoding="utf-8"?>
+<p:sld xmlns:a="http://schemas.openxmlformats.org/drawingml/2006/main" xmlns:r="http://schemas.openxmlformats.org/officeDocument/2006/relationships" xmlns:p="http://schemas.openxmlformats.org/presentationml/2006/main">
+  <p:cSld>
+    <p:spTree>
+      <p:nvGrpSpPr>
+        <p:cNvPr id="1" name=""/>
+        <p:cNvGrpSpPr/>
+        <p:nvPr/>
+      </p:nvGrpSpPr>
+      <p:grpSpPr>
+        <a:xfrm>
+          <a:off x="0" y="0"/>
+          <a:ext cx="0" cy="0"/>
+          <a:chOff x="0" y="0"/>
+          <a:chExt cx="0" cy="0"/>
+        </a:xfrm>
+      </p:grpSpPr>
+      <p:sp>
+        <p:nvSpPr>
+          <p:cNvPr id="3" name="Rectangle 2">
+            <a:extLst>
+              <a:ext uri="{FF2B5EF4-FFF2-40B4-BE49-F238E27FC236}">
+                <a16:creationId xmlns:a16="http://schemas.microsoft.com/office/drawing/2014/main" id="{F14B05A7-BB9F-BE8B-2644-529ADA28BF37}"/>
+              </a:ext>
+            </a:extLst>
+          </p:cNvPr>
+          <p:cNvSpPr/>
+          <p:nvPr/>
+        </p:nvSpPr>
+        <p:spPr>
+          <a:xfrm>
+            <a:off x="146756" y="0"/>
+            <a:ext cx="11898488" cy="892552"/>
+          </a:xfrm>
+          <a:prstGeom prst="rect">
+            <a:avLst/>
+          </a:prstGeom>
+        </p:spPr>
+        <p:txBody>
+          <a:bodyPr wrap="square">
+            <a:spAutoFit/>
+          </a:bodyPr>
+          <a:lstStyle/>
+          <a:p>
+            <a:pPr algn="ctr"/>
+            <a:r>
+              <a:rPr lang="en-IN" sz="3200" b="1" dirty="0">
+                <a:latin typeface="Agency FB" panose="020B0503020202020204" pitchFamily="34" charset="0"/>
+              </a:rPr>
+              <a:t>Where</a:t>
+            </a:r>
+            <a:r>
+              <a:rPr lang="en-IN" sz="3200" dirty="0">
+                <a:latin typeface="Agency FB" panose="020B0503020202020204" pitchFamily="34" charset="0"/>
+              </a:rPr>
+              <a:t> </a:t>
+            </a:r>
+            <a:r>
+              <a:rPr lang="en-IN" sz="3200" b="1" dirty="0">
+                <a:latin typeface="Agency FB" panose="020B0503020202020204" pitchFamily="34" charset="0"/>
+              </a:rPr>
+              <a:t>is</a:t>
+            </a:r>
+            <a:r>
+              <a:rPr lang="en-IN" sz="3200" dirty="0">
+                <a:latin typeface="Agency FB" panose="020B0503020202020204" pitchFamily="34" charset="0"/>
+              </a:rPr>
+              <a:t>: </a:t>
+            </a:r>
+            <a:r>
+              <a:rPr lang="en-IN" sz="5200" dirty="0">
+                <a:solidFill>
+                  <a:schemeClr val="accent6">
+                    <a:lumMod val="75000"/>
+                  </a:schemeClr>
+                </a:solidFill>
+                <a:latin typeface="Agency FB" panose="020B0503020202020204" pitchFamily="34" charset="0"/>
+              </a:rPr>
+              <a:t>H</a:t>
+            </a:r>
+            <a:r>
+              <a:rPr lang="en-IN" sz="5200" baseline="-25000" dirty="0">
+                <a:solidFill>
+                  <a:schemeClr val="accent6">
+                    <a:lumMod val="75000"/>
+                  </a:schemeClr>
+                </a:solidFill>
+                <a:latin typeface="Agency FB" panose="020B0503020202020204" pitchFamily="34" charset="0"/>
+              </a:rPr>
+              <a:t>2</a:t>
+            </a:r>
+            <a:r>
+              <a:rPr lang="en-IN" sz="5200" dirty="0">
+                <a:solidFill>
+                  <a:schemeClr val="accent6">
+                    <a:lumMod val="75000"/>
+                  </a:schemeClr>
+                </a:solidFill>
+                <a:latin typeface="Agency FB" panose="020B0503020202020204" pitchFamily="34" charset="0"/>
+              </a:rPr>
+              <a:t>O </a:t>
+            </a:r>
+            <a:r>
+              <a:rPr lang="en-IN" sz="5200" b="1" dirty="0">
+                <a:solidFill>
+                  <a:schemeClr val="accent6">
+                    <a:lumMod val="75000"/>
+                  </a:schemeClr>
+                </a:solidFill>
+                <a:latin typeface="Agency FB" panose="020B0503020202020204" pitchFamily="34" charset="0"/>
+              </a:rPr>
+              <a:t>Traffic</a:t>
+            </a:r>
+            <a:r>
+              <a:rPr lang="en-IN" sz="5200" dirty="0">
+                <a:solidFill>
+                  <a:schemeClr val="accent6">
+                    <a:lumMod val="75000"/>
+                  </a:schemeClr>
+                </a:solidFill>
+                <a:latin typeface="Agency FB" panose="020B0503020202020204" pitchFamily="34" charset="0"/>
+              </a:rPr>
+              <a:t> More </a:t>
+            </a:r>
+            <a:r>
+              <a:rPr lang="en-IN" sz="5200" b="1" dirty="0">
+                <a:solidFill>
+                  <a:schemeClr val="accent6">
+                    <a:lumMod val="75000"/>
+                  </a:schemeClr>
+                </a:solidFill>
+                <a:latin typeface="Agency FB" panose="020B0503020202020204" pitchFamily="34" charset="0"/>
+              </a:rPr>
+              <a:t>Spatial</a:t>
+            </a:r>
+            <a:r>
+              <a:rPr lang="en-IN" sz="5200" dirty="0">
+                <a:solidFill>
+                  <a:schemeClr val="accent6">
+                    <a:lumMod val="75000"/>
+                  </a:schemeClr>
+                </a:solidFill>
+                <a:latin typeface="Agency FB" panose="020B0503020202020204" pitchFamily="34" charset="0"/>
+              </a:rPr>
+              <a:t> Less </a:t>
+            </a:r>
+            <a:r>
+              <a:rPr lang="en-IN" sz="5200" b="1" dirty="0">
+                <a:solidFill>
+                  <a:srgbClr val="002060"/>
+                </a:solidFill>
+                <a:latin typeface="Agency FB" panose="020B0503020202020204" pitchFamily="34" charset="0"/>
+              </a:rPr>
+              <a:t>Temporal</a:t>
+            </a:r>
+          </a:p>
+        </p:txBody>
+      </p:sp>
+      <p:pic>
+        <p:nvPicPr>
+          <p:cNvPr id="5" name="Picture 4">
+            <a:extLst>
+              <a:ext uri="{FF2B5EF4-FFF2-40B4-BE49-F238E27FC236}">
+                <a16:creationId xmlns:a16="http://schemas.microsoft.com/office/drawing/2014/main" id="{CFDB5CFF-BD0A-07E8-F188-72AF4C22CDED}"/>
+              </a:ext>
+            </a:extLst>
+          </p:cNvPr>
+          <p:cNvPicPr>
+            <a:picLocks noChangeAspect="1"/>
+          </p:cNvPicPr>
+          <p:nvPr/>
+        </p:nvPicPr>
+        <p:blipFill>
+          <a:blip r:embed="rId2"/>
+          <a:stretch>
+            <a:fillRect/>
+          </a:stretch>
+        </p:blipFill>
+        <p:spPr>
+          <a:xfrm>
+            <a:off x="0" y="892552"/>
+            <a:ext cx="12045244" cy="5950191"/>
+          </a:xfrm>
+          <a:prstGeom prst="rect">
+            <a:avLst/>
+          </a:prstGeom>
+        </p:spPr>
+      </p:pic>
+    </p:spTree>
+    <p:extLst>
+      <p:ext uri="{BB962C8B-B14F-4D97-AF65-F5344CB8AC3E}">
+        <p14:creationId xmlns:p14="http://schemas.microsoft.com/office/powerpoint/2010/main" val="1189916357"/>
       </p:ext>
     </p:extLst>
   </p:cSld>

</xml_diff>

<commit_message>
Maps Tester now launches Map in the Optimal Browser
</commit_message>
<xml_diff>
--- a/Report/Pipeline_Process.pptx
+++ b/Report/Pipeline_Process.pptx
@@ -22981,6 +22981,36 @@
           <a:chExt cx="0" cy="0"/>
         </a:xfrm>
       </p:grpSpPr>
+      <p:pic>
+        <p:nvPicPr>
+          <p:cNvPr id="6" name="Picture 5">
+            <a:extLst>
+              <a:ext uri="{FF2B5EF4-FFF2-40B4-BE49-F238E27FC236}">
+                <a16:creationId xmlns:a16="http://schemas.microsoft.com/office/drawing/2014/main" id="{B1F3DECC-C5DF-8A22-1671-CFF92F3B0E5C}"/>
+              </a:ext>
+            </a:extLst>
+          </p:cNvPr>
+          <p:cNvPicPr>
+            <a:picLocks noChangeAspect="1"/>
+          </p:cNvPicPr>
+          <p:nvPr/>
+        </p:nvPicPr>
+        <p:blipFill>
+          <a:blip r:embed="rId2"/>
+          <a:stretch>
+            <a:fillRect/>
+          </a:stretch>
+        </p:blipFill>
+        <p:spPr>
+          <a:xfrm>
+            <a:off x="0" y="892552"/>
+            <a:ext cx="12192000" cy="5965447"/>
+          </a:xfrm>
+          <a:prstGeom prst="rect">
+            <a:avLst/>
+          </a:prstGeom>
+        </p:spPr>
+      </p:pic>
       <p:sp>
         <p:nvSpPr>
           <p:cNvPr id="3" name="Rectangle 2">
@@ -23010,13 +23040,13 @@
           <a:p>
             <a:pPr algn="ctr"/>
             <a:r>
-              <a:rPr lang="en-IN" sz="3200" dirty="0">
+              <a:rPr lang="en-IN" sz="3200">
                 <a:latin typeface="Agency FB" panose="020B0503020202020204" pitchFamily="34" charset="0"/>
               </a:rPr>
               <a:t>Air and Traffic: </a:t>
             </a:r>
             <a:r>
-              <a:rPr lang="en-IN" sz="5200" dirty="0">
+              <a:rPr lang="en-IN" sz="5200">
                 <a:solidFill>
                   <a:schemeClr val="accent6">
                     <a:lumMod val="75000"/>
@@ -23035,36 +23065,6 @@
           </a:p>
         </p:txBody>
       </p:sp>
-      <p:pic>
-        <p:nvPicPr>
-          <p:cNvPr id="5" name="Picture 4">
-            <a:extLst>
-              <a:ext uri="{FF2B5EF4-FFF2-40B4-BE49-F238E27FC236}">
-                <a16:creationId xmlns:a16="http://schemas.microsoft.com/office/drawing/2014/main" id="{E63A6700-3168-2B21-3A83-CCBDDD6CCF86}"/>
-              </a:ext>
-            </a:extLst>
-          </p:cNvPr>
-          <p:cNvPicPr>
-            <a:picLocks noChangeAspect="1"/>
-          </p:cNvPicPr>
-          <p:nvPr/>
-        </p:nvPicPr>
-        <p:blipFill>
-          <a:blip r:embed="rId2"/>
-          <a:stretch>
-            <a:fillRect/>
-          </a:stretch>
-        </p:blipFill>
-        <p:spPr>
-          <a:xfrm>
-            <a:off x="0" y="892552"/>
-            <a:ext cx="12045244" cy="5965447"/>
-          </a:xfrm>
-          <a:prstGeom prst="rect">
-            <a:avLst/>
-          </a:prstGeom>
-        </p:spPr>
-      </p:pic>
     </p:spTree>
     <p:extLst>
       <p:ext uri="{BB962C8B-B14F-4D97-AF65-F5344CB8AC3E}">

</xml_diff>